<commit_message>
add registration with RAM
</commit_message>
<xml_diff>
--- a/Презентация On_OFF_sensor.pptx
+++ b/Презентация On_OFF_sensor.pptx
@@ -16,11 +16,12 @@
     <p:sldId id="264" r:id="rId10"/>
     <p:sldId id="268" r:id="rId11"/>
     <p:sldId id="266" r:id="rId12"/>
-    <p:sldId id="265" r:id="rId13"/>
-    <p:sldId id="267" r:id="rId14"/>
-    <p:sldId id="269" r:id="rId15"/>
+    <p:sldId id="270" r:id="rId13"/>
+    <p:sldId id="265" r:id="rId14"/>
+    <p:sldId id="267" r:id="rId15"/>
+    <p:sldId id="269" r:id="rId16"/>
   </p:sldIdLst>
-  <p:sldSz cx="9144000" cy="6858000" type="screen4x3"/>
+  <p:sldSz cx="12192000" cy="6858000"/>
   <p:notesSz cx="6858000" cy="9144000"/>
   <p:defaultTextStyle>
     <a:defPPr>
@@ -133,12 +134,27 @@
             <p14:sldId id="264"/>
             <p14:sldId id="268"/>
             <p14:sldId id="266"/>
+            <p14:sldId id="270"/>
             <p14:sldId id="265"/>
             <p14:sldId id="267"/>
             <p14:sldId id="269"/>
           </p14:sldIdLst>
         </p14:section>
       </p14:sectionLst>
+    </p:ext>
+    <p:ext uri="{EFAFB233-063F-42B5-8137-9DF3F51BA10A}">
+      <p15:sldGuideLst xmlns="" xmlns:p15="http://schemas.microsoft.com/office/powerpoint/2012/main">
+        <p15:guide id="1" orient="horz" pos="2160" userDrawn="1">
+          <p15:clr>
+            <a:srgbClr val="A4A3A4"/>
+          </p15:clr>
+        </p15:guide>
+        <p15:guide id="2" pos="3840" userDrawn="1">
+          <p15:clr>
+            <a:srgbClr val="A4A3A4"/>
+          </p15:clr>
+        </p15:guide>
+      </p15:sldGuideLst>
     </p:ext>
   </p:extLst>
 </p:presentation>
@@ -173,8 +189,8 @@
         </p:nvSpPr>
         <p:spPr>
           <a:xfrm>
-            <a:off x="685800" y="2130425"/>
-            <a:ext cx="7772400" cy="1470025"/>
+            <a:off x="914400" y="2130426"/>
+            <a:ext cx="10363200" cy="1470025"/>
           </a:xfrm>
         </p:spPr>
         <p:txBody>
@@ -182,10 +198,9 @@
           <a:lstStyle/>
           <a:p>
             <a:r>
-              <a:rPr lang="ru-RU" smtClean="0"/>
+              <a:rPr lang="ru-RU"/>
               <a:t>Образец заголовка</a:t>
             </a:r>
-            <a:endParaRPr lang="ru-RU"/>
           </a:p>
         </p:txBody>
       </p:sp>
@@ -201,8 +216,8 @@
         </p:nvSpPr>
         <p:spPr>
           <a:xfrm>
-            <a:off x="1371600" y="3886200"/>
-            <a:ext cx="6400800" cy="1752600"/>
+            <a:off x="1828800" y="3886200"/>
+            <a:ext cx="8534400" cy="1752600"/>
           </a:xfrm>
         </p:spPr>
         <p:txBody>
@@ -301,10 +316,9 @@
           </a:lstStyle>
           <a:p>
             <a:r>
-              <a:rPr lang="ru-RU" smtClean="0"/>
+              <a:rPr lang="ru-RU"/>
               <a:t>Образец подзаголовка</a:t>
             </a:r>
-            <a:endParaRPr lang="ru-RU"/>
           </a:p>
         </p:txBody>
       </p:sp>
@@ -419,10 +433,9 @@
           <a:lstStyle/>
           <a:p>
             <a:r>
-              <a:rPr lang="ru-RU" smtClean="0"/>
+              <a:rPr lang="ru-RU"/>
               <a:t>Образец заголовка</a:t>
             </a:r>
-            <a:endParaRPr lang="ru-RU"/>
           </a:p>
         </p:txBody>
       </p:sp>
@@ -443,38 +456,37 @@
           <a:p>
             <a:pPr lvl="0"/>
             <a:r>
-              <a:rPr lang="ru-RU" smtClean="0"/>
+              <a:rPr lang="ru-RU"/>
               <a:t>Образец текста</a:t>
             </a:r>
           </a:p>
           <a:p>
             <a:pPr lvl="1"/>
             <a:r>
-              <a:rPr lang="ru-RU" smtClean="0"/>
+              <a:rPr lang="ru-RU"/>
               <a:t>Второй уровень</a:t>
             </a:r>
           </a:p>
           <a:p>
             <a:pPr lvl="2"/>
             <a:r>
-              <a:rPr lang="ru-RU" smtClean="0"/>
+              <a:rPr lang="ru-RU"/>
               <a:t>Третий уровень</a:t>
             </a:r>
           </a:p>
           <a:p>
             <a:pPr lvl="3"/>
             <a:r>
-              <a:rPr lang="ru-RU" smtClean="0"/>
+              <a:rPr lang="ru-RU"/>
               <a:t>Четвертый уровень</a:t>
             </a:r>
           </a:p>
           <a:p>
             <a:pPr lvl="4"/>
             <a:r>
-              <a:rPr lang="ru-RU" smtClean="0"/>
+              <a:rPr lang="ru-RU"/>
               <a:t>Пятый уровень</a:t>
             </a:r>
-            <a:endParaRPr lang="ru-RU"/>
           </a:p>
         </p:txBody>
       </p:sp>
@@ -585,8 +597,8 @@
         </p:nvSpPr>
         <p:spPr>
           <a:xfrm>
-            <a:off x="6629400" y="274638"/>
-            <a:ext cx="2057400" cy="5851525"/>
+            <a:off x="8839200" y="274639"/>
+            <a:ext cx="2743200" cy="5851525"/>
           </a:xfrm>
         </p:spPr>
         <p:txBody>
@@ -594,10 +606,9 @@
           <a:lstStyle/>
           <a:p>
             <a:r>
-              <a:rPr lang="ru-RU" smtClean="0"/>
+              <a:rPr lang="ru-RU"/>
               <a:t>Образец заголовка</a:t>
             </a:r>
-            <a:endParaRPr lang="ru-RU"/>
           </a:p>
         </p:txBody>
       </p:sp>
@@ -613,8 +624,8 @@
         </p:nvSpPr>
         <p:spPr>
           <a:xfrm>
-            <a:off x="457200" y="274638"/>
-            <a:ext cx="6019800" cy="5851525"/>
+            <a:off x="609600" y="274639"/>
+            <a:ext cx="8026400" cy="5851525"/>
           </a:xfrm>
         </p:spPr>
         <p:txBody>
@@ -623,38 +634,37 @@
           <a:p>
             <a:pPr lvl="0"/>
             <a:r>
-              <a:rPr lang="ru-RU" smtClean="0"/>
+              <a:rPr lang="ru-RU"/>
               <a:t>Образец текста</a:t>
             </a:r>
           </a:p>
           <a:p>
             <a:pPr lvl="1"/>
             <a:r>
-              <a:rPr lang="ru-RU" smtClean="0"/>
+              <a:rPr lang="ru-RU"/>
               <a:t>Второй уровень</a:t>
             </a:r>
           </a:p>
           <a:p>
             <a:pPr lvl="2"/>
             <a:r>
-              <a:rPr lang="ru-RU" smtClean="0"/>
+              <a:rPr lang="ru-RU"/>
               <a:t>Третий уровень</a:t>
             </a:r>
           </a:p>
           <a:p>
             <a:pPr lvl="3"/>
             <a:r>
-              <a:rPr lang="ru-RU" smtClean="0"/>
+              <a:rPr lang="ru-RU"/>
               <a:t>Четвертый уровень</a:t>
             </a:r>
           </a:p>
           <a:p>
             <a:pPr lvl="4"/>
             <a:r>
-              <a:rPr lang="ru-RU" smtClean="0"/>
+              <a:rPr lang="ru-RU"/>
               <a:t>Пятый уровень</a:t>
             </a:r>
-            <a:endParaRPr lang="ru-RU"/>
           </a:p>
         </p:txBody>
       </p:sp>
@@ -769,10 +779,9 @@
           <a:lstStyle/>
           <a:p>
             <a:r>
-              <a:rPr lang="ru-RU" smtClean="0"/>
+              <a:rPr lang="ru-RU"/>
               <a:t>Образец заголовка</a:t>
             </a:r>
-            <a:endParaRPr lang="ru-RU"/>
           </a:p>
         </p:txBody>
       </p:sp>
@@ -793,38 +802,37 @@
           <a:p>
             <a:pPr lvl="0"/>
             <a:r>
-              <a:rPr lang="ru-RU" smtClean="0"/>
+              <a:rPr lang="ru-RU"/>
               <a:t>Образец текста</a:t>
             </a:r>
           </a:p>
           <a:p>
             <a:pPr lvl="1"/>
             <a:r>
-              <a:rPr lang="ru-RU" smtClean="0"/>
+              <a:rPr lang="ru-RU"/>
               <a:t>Второй уровень</a:t>
             </a:r>
           </a:p>
           <a:p>
             <a:pPr lvl="2"/>
             <a:r>
-              <a:rPr lang="ru-RU" smtClean="0"/>
+              <a:rPr lang="ru-RU"/>
               <a:t>Третий уровень</a:t>
             </a:r>
           </a:p>
           <a:p>
             <a:pPr lvl="3"/>
             <a:r>
-              <a:rPr lang="ru-RU" smtClean="0"/>
+              <a:rPr lang="ru-RU"/>
               <a:t>Четвертый уровень</a:t>
             </a:r>
           </a:p>
           <a:p>
             <a:pPr lvl="4"/>
             <a:r>
-              <a:rPr lang="ru-RU" smtClean="0"/>
+              <a:rPr lang="ru-RU"/>
               <a:t>Пятый уровень</a:t>
             </a:r>
-            <a:endParaRPr lang="ru-RU"/>
           </a:p>
         </p:txBody>
       </p:sp>
@@ -935,8 +943,8 @@
         </p:nvSpPr>
         <p:spPr>
           <a:xfrm>
-            <a:off x="722313" y="4406900"/>
-            <a:ext cx="7772400" cy="1362075"/>
+            <a:off x="963084" y="4406901"/>
+            <a:ext cx="10363200" cy="1362075"/>
           </a:xfrm>
         </p:spPr>
         <p:txBody>
@@ -948,10 +956,9 @@
           </a:lstStyle>
           <a:p>
             <a:r>
-              <a:rPr lang="ru-RU" smtClean="0"/>
+              <a:rPr lang="ru-RU"/>
               <a:t>Образец заголовка</a:t>
             </a:r>
-            <a:endParaRPr lang="ru-RU"/>
           </a:p>
         </p:txBody>
       </p:sp>
@@ -967,8 +974,8 @@
         </p:nvSpPr>
         <p:spPr>
           <a:xfrm>
-            <a:off x="722313" y="2906713"/>
-            <a:ext cx="7772400" cy="1500187"/>
+            <a:off x="963084" y="2906713"/>
+            <a:ext cx="10363200" cy="1500187"/>
           </a:xfrm>
         </p:spPr>
         <p:txBody>
@@ -1068,7 +1075,7 @@
           <a:p>
             <a:pPr lvl="0"/>
             <a:r>
-              <a:rPr lang="ru-RU" smtClean="0"/>
+              <a:rPr lang="ru-RU"/>
               <a:t>Образец текста</a:t>
             </a:r>
           </a:p>
@@ -1185,10 +1192,9 @@
           <a:lstStyle/>
           <a:p>
             <a:r>
-              <a:rPr lang="ru-RU" smtClean="0"/>
+              <a:rPr lang="ru-RU"/>
               <a:t>Образец заголовка</a:t>
             </a:r>
-            <a:endParaRPr lang="ru-RU"/>
           </a:p>
         </p:txBody>
       </p:sp>
@@ -1204,8 +1210,8 @@
         </p:nvSpPr>
         <p:spPr>
           <a:xfrm>
-            <a:off x="457200" y="1600200"/>
-            <a:ext cx="4038600" cy="4525963"/>
+            <a:off x="609600" y="1600201"/>
+            <a:ext cx="5384800" cy="4525963"/>
           </a:xfrm>
         </p:spPr>
         <p:txBody>
@@ -1242,38 +1248,37 @@
           <a:p>
             <a:pPr lvl="0"/>
             <a:r>
-              <a:rPr lang="ru-RU" smtClean="0"/>
+              <a:rPr lang="ru-RU"/>
               <a:t>Образец текста</a:t>
             </a:r>
           </a:p>
           <a:p>
             <a:pPr lvl="1"/>
             <a:r>
-              <a:rPr lang="ru-RU" smtClean="0"/>
+              <a:rPr lang="ru-RU"/>
               <a:t>Второй уровень</a:t>
             </a:r>
           </a:p>
           <a:p>
             <a:pPr lvl="2"/>
             <a:r>
-              <a:rPr lang="ru-RU" smtClean="0"/>
+              <a:rPr lang="ru-RU"/>
               <a:t>Третий уровень</a:t>
             </a:r>
           </a:p>
           <a:p>
             <a:pPr lvl="3"/>
             <a:r>
-              <a:rPr lang="ru-RU" smtClean="0"/>
+              <a:rPr lang="ru-RU"/>
               <a:t>Четвертый уровень</a:t>
             </a:r>
           </a:p>
           <a:p>
             <a:pPr lvl="4"/>
             <a:r>
-              <a:rPr lang="ru-RU" smtClean="0"/>
+              <a:rPr lang="ru-RU"/>
               <a:t>Пятый уровень</a:t>
             </a:r>
-            <a:endParaRPr lang="ru-RU"/>
           </a:p>
         </p:txBody>
       </p:sp>
@@ -1289,8 +1294,8 @@
         </p:nvSpPr>
         <p:spPr>
           <a:xfrm>
-            <a:off x="4648200" y="1600200"/>
-            <a:ext cx="4038600" cy="4525963"/>
+            <a:off x="6197600" y="1600201"/>
+            <a:ext cx="5384800" cy="4525963"/>
           </a:xfrm>
         </p:spPr>
         <p:txBody>
@@ -1327,38 +1332,37 @@
           <a:p>
             <a:pPr lvl="0"/>
             <a:r>
-              <a:rPr lang="ru-RU" smtClean="0"/>
+              <a:rPr lang="ru-RU"/>
               <a:t>Образец текста</a:t>
             </a:r>
           </a:p>
           <a:p>
             <a:pPr lvl="1"/>
             <a:r>
-              <a:rPr lang="ru-RU" smtClean="0"/>
+              <a:rPr lang="ru-RU"/>
               <a:t>Второй уровень</a:t>
             </a:r>
           </a:p>
           <a:p>
             <a:pPr lvl="2"/>
             <a:r>
-              <a:rPr lang="ru-RU" smtClean="0"/>
+              <a:rPr lang="ru-RU"/>
               <a:t>Третий уровень</a:t>
             </a:r>
           </a:p>
           <a:p>
             <a:pPr lvl="3"/>
             <a:r>
-              <a:rPr lang="ru-RU" smtClean="0"/>
+              <a:rPr lang="ru-RU"/>
               <a:t>Четвертый уровень</a:t>
             </a:r>
           </a:p>
           <a:p>
             <a:pPr lvl="4"/>
             <a:r>
-              <a:rPr lang="ru-RU" smtClean="0"/>
+              <a:rPr lang="ru-RU"/>
               <a:t>Пятый уровень</a:t>
             </a:r>
-            <a:endParaRPr lang="ru-RU"/>
           </a:p>
         </p:txBody>
       </p:sp>
@@ -1477,10 +1481,9 @@
           </a:lstStyle>
           <a:p>
             <a:r>
-              <a:rPr lang="ru-RU" smtClean="0"/>
+              <a:rPr lang="ru-RU"/>
               <a:t>Образец заголовка</a:t>
             </a:r>
-            <a:endParaRPr lang="ru-RU"/>
           </a:p>
         </p:txBody>
       </p:sp>
@@ -1496,8 +1499,8 @@
         </p:nvSpPr>
         <p:spPr>
           <a:xfrm>
-            <a:off x="457200" y="1535113"/>
-            <a:ext cx="4040188" cy="639762"/>
+            <a:off x="609600" y="1535113"/>
+            <a:ext cx="5386917" cy="639762"/>
           </a:xfrm>
         </p:spPr>
         <p:txBody>
@@ -1543,7 +1546,7 @@
           <a:p>
             <a:pPr lvl="0"/>
             <a:r>
-              <a:rPr lang="ru-RU" smtClean="0"/>
+              <a:rPr lang="ru-RU"/>
               <a:t>Образец текста</a:t>
             </a:r>
           </a:p>
@@ -1561,8 +1564,8 @@
         </p:nvSpPr>
         <p:spPr>
           <a:xfrm>
-            <a:off x="457200" y="2174875"/>
-            <a:ext cx="4040188" cy="3951288"/>
+            <a:off x="609600" y="2174875"/>
+            <a:ext cx="5386917" cy="3951288"/>
           </a:xfrm>
         </p:spPr>
         <p:txBody>
@@ -1599,38 +1602,37 @@
           <a:p>
             <a:pPr lvl="0"/>
             <a:r>
-              <a:rPr lang="ru-RU" smtClean="0"/>
+              <a:rPr lang="ru-RU"/>
               <a:t>Образец текста</a:t>
             </a:r>
           </a:p>
           <a:p>
             <a:pPr lvl="1"/>
             <a:r>
-              <a:rPr lang="ru-RU" smtClean="0"/>
+              <a:rPr lang="ru-RU"/>
               <a:t>Второй уровень</a:t>
             </a:r>
           </a:p>
           <a:p>
             <a:pPr lvl="2"/>
             <a:r>
-              <a:rPr lang="ru-RU" smtClean="0"/>
+              <a:rPr lang="ru-RU"/>
               <a:t>Третий уровень</a:t>
             </a:r>
           </a:p>
           <a:p>
             <a:pPr lvl="3"/>
             <a:r>
-              <a:rPr lang="ru-RU" smtClean="0"/>
+              <a:rPr lang="ru-RU"/>
               <a:t>Четвертый уровень</a:t>
             </a:r>
           </a:p>
           <a:p>
             <a:pPr lvl="4"/>
             <a:r>
-              <a:rPr lang="ru-RU" smtClean="0"/>
+              <a:rPr lang="ru-RU"/>
               <a:t>Пятый уровень</a:t>
             </a:r>
-            <a:endParaRPr lang="ru-RU"/>
           </a:p>
         </p:txBody>
       </p:sp>
@@ -1646,8 +1648,8 @@
         </p:nvSpPr>
         <p:spPr>
           <a:xfrm>
-            <a:off x="4645025" y="1535113"/>
-            <a:ext cx="4041775" cy="639762"/>
+            <a:off x="6193368" y="1535113"/>
+            <a:ext cx="5389033" cy="639762"/>
           </a:xfrm>
         </p:spPr>
         <p:txBody>
@@ -1693,7 +1695,7 @@
           <a:p>
             <a:pPr lvl="0"/>
             <a:r>
-              <a:rPr lang="ru-RU" smtClean="0"/>
+              <a:rPr lang="ru-RU"/>
               <a:t>Образец текста</a:t>
             </a:r>
           </a:p>
@@ -1711,8 +1713,8 @@
         </p:nvSpPr>
         <p:spPr>
           <a:xfrm>
-            <a:off x="4645025" y="2174875"/>
-            <a:ext cx="4041775" cy="3951288"/>
+            <a:off x="6193368" y="2174875"/>
+            <a:ext cx="5389033" cy="3951288"/>
           </a:xfrm>
         </p:spPr>
         <p:txBody>
@@ -1749,38 +1751,37 @@
           <a:p>
             <a:pPr lvl="0"/>
             <a:r>
-              <a:rPr lang="ru-RU" smtClean="0"/>
+              <a:rPr lang="ru-RU"/>
               <a:t>Образец текста</a:t>
             </a:r>
           </a:p>
           <a:p>
             <a:pPr lvl="1"/>
             <a:r>
-              <a:rPr lang="ru-RU" smtClean="0"/>
+              <a:rPr lang="ru-RU"/>
               <a:t>Второй уровень</a:t>
             </a:r>
           </a:p>
           <a:p>
             <a:pPr lvl="2"/>
             <a:r>
-              <a:rPr lang="ru-RU" smtClean="0"/>
+              <a:rPr lang="ru-RU"/>
               <a:t>Третий уровень</a:t>
             </a:r>
           </a:p>
           <a:p>
             <a:pPr lvl="3"/>
             <a:r>
-              <a:rPr lang="ru-RU" smtClean="0"/>
+              <a:rPr lang="ru-RU"/>
               <a:t>Четвертый уровень</a:t>
             </a:r>
           </a:p>
           <a:p>
             <a:pPr lvl="4"/>
             <a:r>
-              <a:rPr lang="ru-RU" smtClean="0"/>
+              <a:rPr lang="ru-RU"/>
               <a:t>Пятый уровень</a:t>
             </a:r>
-            <a:endParaRPr lang="ru-RU"/>
           </a:p>
         </p:txBody>
       </p:sp>
@@ -1895,10 +1896,9 @@
           <a:lstStyle/>
           <a:p>
             <a:r>
-              <a:rPr lang="ru-RU" smtClean="0"/>
+              <a:rPr lang="ru-RU"/>
               <a:t>Образец заголовка</a:t>
             </a:r>
-            <a:endParaRPr lang="ru-RU"/>
           </a:p>
         </p:txBody>
       </p:sp>
@@ -2104,8 +2104,8 @@
         </p:nvSpPr>
         <p:spPr>
           <a:xfrm>
-            <a:off x="457200" y="273050"/>
-            <a:ext cx="3008313" cy="1162050"/>
+            <a:off x="609601" y="273050"/>
+            <a:ext cx="4011084" cy="1162050"/>
           </a:xfrm>
         </p:spPr>
         <p:txBody>
@@ -2117,10 +2117,9 @@
           </a:lstStyle>
           <a:p>
             <a:r>
-              <a:rPr lang="ru-RU" smtClean="0"/>
+              <a:rPr lang="ru-RU"/>
               <a:t>Образец заголовка</a:t>
             </a:r>
-            <a:endParaRPr lang="ru-RU"/>
           </a:p>
         </p:txBody>
       </p:sp>
@@ -2136,8 +2135,8 @@
         </p:nvSpPr>
         <p:spPr>
           <a:xfrm>
-            <a:off x="3575050" y="273050"/>
-            <a:ext cx="5111750" cy="5853113"/>
+            <a:off x="4766733" y="273051"/>
+            <a:ext cx="6815667" cy="5853113"/>
           </a:xfrm>
         </p:spPr>
         <p:txBody>
@@ -2174,38 +2173,37 @@
           <a:p>
             <a:pPr lvl="0"/>
             <a:r>
-              <a:rPr lang="ru-RU" smtClean="0"/>
+              <a:rPr lang="ru-RU"/>
               <a:t>Образец текста</a:t>
             </a:r>
           </a:p>
           <a:p>
             <a:pPr lvl="1"/>
             <a:r>
-              <a:rPr lang="ru-RU" smtClean="0"/>
+              <a:rPr lang="ru-RU"/>
               <a:t>Второй уровень</a:t>
             </a:r>
           </a:p>
           <a:p>
             <a:pPr lvl="2"/>
             <a:r>
-              <a:rPr lang="ru-RU" smtClean="0"/>
+              <a:rPr lang="ru-RU"/>
               <a:t>Третий уровень</a:t>
             </a:r>
           </a:p>
           <a:p>
             <a:pPr lvl="3"/>
             <a:r>
-              <a:rPr lang="ru-RU" smtClean="0"/>
+              <a:rPr lang="ru-RU"/>
               <a:t>Четвертый уровень</a:t>
             </a:r>
           </a:p>
           <a:p>
             <a:pPr lvl="4"/>
             <a:r>
-              <a:rPr lang="ru-RU" smtClean="0"/>
+              <a:rPr lang="ru-RU"/>
               <a:t>Пятый уровень</a:t>
             </a:r>
-            <a:endParaRPr lang="ru-RU"/>
           </a:p>
         </p:txBody>
       </p:sp>
@@ -2221,8 +2219,8 @@
         </p:nvSpPr>
         <p:spPr>
           <a:xfrm>
-            <a:off x="457200" y="1435100"/>
-            <a:ext cx="3008313" cy="4691063"/>
+            <a:off x="609601" y="1435101"/>
+            <a:ext cx="4011084" cy="4691063"/>
           </a:xfrm>
         </p:spPr>
         <p:txBody>
@@ -2268,7 +2266,7 @@
           <a:p>
             <a:pPr lvl="0"/>
             <a:r>
-              <a:rPr lang="ru-RU" smtClean="0"/>
+              <a:rPr lang="ru-RU"/>
               <a:t>Образец текста</a:t>
             </a:r>
           </a:p>
@@ -2381,8 +2379,8 @@
         </p:nvSpPr>
         <p:spPr>
           <a:xfrm>
-            <a:off x="1792288" y="4800600"/>
-            <a:ext cx="5486400" cy="566738"/>
+            <a:off x="2389717" y="4800600"/>
+            <a:ext cx="7315200" cy="566738"/>
           </a:xfrm>
         </p:spPr>
         <p:txBody>
@@ -2394,10 +2392,9 @@
           </a:lstStyle>
           <a:p>
             <a:r>
-              <a:rPr lang="ru-RU" smtClean="0"/>
+              <a:rPr lang="ru-RU"/>
               <a:t>Образец заголовка</a:t>
             </a:r>
-            <a:endParaRPr lang="ru-RU"/>
           </a:p>
         </p:txBody>
       </p:sp>
@@ -2413,8 +2410,8 @@
         </p:nvSpPr>
         <p:spPr>
           <a:xfrm>
-            <a:off x="1792288" y="612775"/>
-            <a:ext cx="5486400" cy="4114800"/>
+            <a:off x="2389717" y="612775"/>
+            <a:ext cx="7315200" cy="4114800"/>
           </a:xfrm>
         </p:spPr>
         <p:txBody>
@@ -2474,8 +2471,8 @@
         </p:nvSpPr>
         <p:spPr>
           <a:xfrm>
-            <a:off x="1792288" y="5367338"/>
-            <a:ext cx="5486400" cy="804862"/>
+            <a:off x="2389717" y="5367338"/>
+            <a:ext cx="7315200" cy="804862"/>
           </a:xfrm>
         </p:spPr>
         <p:txBody>
@@ -2521,7 +2518,7 @@
           <a:p>
             <a:pPr lvl="0"/>
             <a:r>
-              <a:rPr lang="ru-RU" smtClean="0"/>
+              <a:rPr lang="ru-RU"/>
               <a:t>Образец текста</a:t>
             </a:r>
           </a:p>
@@ -2639,8 +2636,8 @@
         </p:nvSpPr>
         <p:spPr>
           <a:xfrm>
-            <a:off x="457200" y="274638"/>
-            <a:ext cx="8229600" cy="1143000"/>
+            <a:off x="609600" y="274638"/>
+            <a:ext cx="10972800" cy="1143000"/>
           </a:xfrm>
           <a:prstGeom prst="rect">
             <a:avLst/>
@@ -2653,10 +2650,9 @@
           <a:lstStyle/>
           <a:p>
             <a:r>
-              <a:rPr lang="ru-RU" smtClean="0"/>
+              <a:rPr lang="ru-RU"/>
               <a:t>Образец заголовка</a:t>
             </a:r>
-            <a:endParaRPr lang="ru-RU"/>
           </a:p>
         </p:txBody>
       </p:sp>
@@ -2672,8 +2668,8 @@
         </p:nvSpPr>
         <p:spPr>
           <a:xfrm>
-            <a:off x="457200" y="1600200"/>
-            <a:ext cx="8229600" cy="4525963"/>
+            <a:off x="609600" y="1600201"/>
+            <a:ext cx="10972800" cy="4525963"/>
           </a:xfrm>
           <a:prstGeom prst="rect">
             <a:avLst/>
@@ -2687,38 +2683,37 @@
           <a:p>
             <a:pPr lvl="0"/>
             <a:r>
-              <a:rPr lang="ru-RU" smtClean="0"/>
+              <a:rPr lang="ru-RU"/>
               <a:t>Образец текста</a:t>
             </a:r>
           </a:p>
           <a:p>
             <a:pPr lvl="1"/>
             <a:r>
-              <a:rPr lang="ru-RU" smtClean="0"/>
+              <a:rPr lang="ru-RU"/>
               <a:t>Второй уровень</a:t>
             </a:r>
           </a:p>
           <a:p>
             <a:pPr lvl="2"/>
             <a:r>
-              <a:rPr lang="ru-RU" smtClean="0"/>
+              <a:rPr lang="ru-RU"/>
               <a:t>Третий уровень</a:t>
             </a:r>
           </a:p>
           <a:p>
             <a:pPr lvl="3"/>
             <a:r>
-              <a:rPr lang="ru-RU" smtClean="0"/>
+              <a:rPr lang="ru-RU"/>
               <a:t>Четвертый уровень</a:t>
             </a:r>
           </a:p>
           <a:p>
             <a:pPr lvl="4"/>
             <a:r>
-              <a:rPr lang="ru-RU" smtClean="0"/>
+              <a:rPr lang="ru-RU"/>
               <a:t>Пятый уровень</a:t>
             </a:r>
-            <a:endParaRPr lang="ru-RU"/>
           </a:p>
         </p:txBody>
       </p:sp>
@@ -2734,8 +2729,8 @@
         </p:nvSpPr>
         <p:spPr>
           <a:xfrm>
-            <a:off x="457200" y="6356350"/>
-            <a:ext cx="2133600" cy="365125"/>
+            <a:off x="609600" y="6356351"/>
+            <a:ext cx="2844800" cy="365125"/>
           </a:xfrm>
           <a:prstGeom prst="rect">
             <a:avLst/>
@@ -2775,8 +2770,8 @@
         </p:nvSpPr>
         <p:spPr>
           <a:xfrm>
-            <a:off x="3124200" y="6356350"/>
-            <a:ext cx="2895600" cy="365125"/>
+            <a:off x="4165600" y="6356351"/>
+            <a:ext cx="3860800" cy="365125"/>
           </a:xfrm>
           <a:prstGeom prst="rect">
             <a:avLst/>
@@ -2812,8 +2807,8 @@
         </p:nvSpPr>
         <p:spPr>
           <a:xfrm>
-            <a:off x="6553200" y="6356350"/>
-            <a:ext cx="2133600" cy="365125"/>
+            <a:off x="8737600" y="6356351"/>
+            <a:ext cx="2844800" cy="365125"/>
           </a:xfrm>
           <a:prstGeom prst="rect">
             <a:avLst/>
@@ -3144,29 +3139,35 @@
         </p:nvSpPr>
         <p:spPr>
           <a:xfrm>
-            <a:off x="683568" y="692696"/>
-            <a:ext cx="7772400" cy="2016224"/>
+            <a:off x="618928" y="692696"/>
+            <a:ext cx="10949680" cy="2016224"/>
           </a:xfrm>
         </p:spPr>
         <p:txBody>
           <a:bodyPr>
-            <a:normAutofit fontScale="90000"/>
+            <a:normAutofit/>
           </a:bodyPr>
           <a:lstStyle/>
           <a:p>
             <a:r>
-              <a:rPr lang="ru-RU" dirty="0" smtClean="0"/>
+              <a:rPr lang="ru-RU" sz="3200" dirty="0"/>
               <a:t>Проект: </a:t>
             </a:r>
             <a:r>
-              <a:rPr lang="en-US" dirty="0" err="1" smtClean="0"/>
+              <a:rPr lang="en-US" sz="3200" i="1" dirty="0" err="1"/>
               <a:t>ON_OFF_sensor</a:t>
             </a:r>
             <a:r>
-              <a:rPr lang="ru-RU" dirty="0" smtClean="0"/>
-              <a:t> управление датчиком включения выключения электричества</a:t>
-            </a:r>
-            <a:endParaRPr lang="ru-RU" dirty="0"/>
+              <a:rPr lang="ru-RU" sz="3200" dirty="0"/>
+              <a:t/>
+            </a:r>
+            <a:br>
+              <a:rPr lang="ru-RU" sz="3200" dirty="0"/>
+            </a:br>
+            <a:r>
+              <a:rPr lang="ru-RU" sz="3200" dirty="0"/>
+              <a:t>управление датчиком включения/отключения электричества</a:t>
+            </a:r>
           </a:p>
         </p:txBody>
       </p:sp>
@@ -3184,7 +3185,7 @@
         </p:blipFill>
         <p:spPr>
           <a:xfrm>
-            <a:off x="2660966" y="3140968"/>
+            <a:off x="4182735" y="3103671"/>
             <a:ext cx="3822065" cy="2482215"/>
           </a:xfrm>
           <a:prstGeom prst="rect">
@@ -3200,7 +3201,7 @@
         </p:nvSpPr>
         <p:spPr>
           <a:xfrm>
-            <a:off x="1691680" y="5949280"/>
+            <a:off x="2709392" y="5980638"/>
             <a:ext cx="6768752" cy="369332"/>
           </a:xfrm>
           <a:prstGeom prst="rect">
@@ -3216,11 +3217,7 @@
           <a:p>
             <a:r>
               <a:rPr lang="ru-RU" dirty="0"/>
-              <a:t>сайт </a:t>
-            </a:r>
-            <a:r>
-              <a:rPr lang="ru-RU" dirty="0" smtClean="0"/>
-              <a:t>сенсора с описанием </a:t>
+              <a:t>сайт сенсора с описанием </a:t>
             </a:r>
             <a:r>
               <a:rPr lang="en-US" dirty="0"/>
@@ -3268,18 +3265,18 @@
       </p:grpSpPr>
       <p:sp>
         <p:nvSpPr>
-          <p:cNvPr id="2" name="Заголовок 1"/>
-          <p:cNvSpPr>
-            <a:spLocks noGrp="1"/>
-          </p:cNvSpPr>
-          <p:nvPr>
-            <p:ph type="title"/>
+          <p:cNvPr id="3" name="Объект 2"/>
+          <p:cNvSpPr>
+            <a:spLocks noGrp="1"/>
+          </p:cNvSpPr>
+          <p:nvPr>
+            <p:ph idx="1"/>
           </p:nvPr>
         </p:nvSpPr>
         <p:spPr>
           <a:xfrm>
-            <a:off x="467544" y="260648"/>
-            <a:ext cx="8229600" cy="854968"/>
+            <a:off x="407368" y="1674601"/>
+            <a:ext cx="4109148" cy="4320480"/>
           </a:xfrm>
         </p:spPr>
         <p:txBody>
@@ -3287,49 +3284,24 @@
           <a:lstStyle/>
           <a:p>
             <a:r>
-              <a:rPr lang="ru-RU" dirty="0"/>
-              <a:t>Что реализовано в проекте</a:t>
-            </a:r>
-          </a:p>
-        </p:txBody>
-      </p:sp>
-      <p:sp>
-        <p:nvSpPr>
-          <p:cNvPr id="3" name="Объект 2"/>
-          <p:cNvSpPr>
-            <a:spLocks noGrp="1"/>
-          </p:cNvSpPr>
-          <p:nvPr>
-            <p:ph idx="1"/>
-          </p:nvPr>
-        </p:nvSpPr>
-        <p:spPr>
-          <a:xfrm>
-            <a:off x="467544" y="1196752"/>
-            <a:ext cx="8229600" cy="4525963"/>
-          </a:xfrm>
-        </p:spPr>
-        <p:txBody>
-          <a:bodyPr/>
-          <a:lstStyle/>
-          <a:p>
-            <a:r>
               <a:rPr lang="ru-RU" sz="2000" dirty="0"/>
-              <a:t>Каждый гость, после регистрации получает доступ к определенной локации в доме, и может управлять только теми датчиками, которые находятся в этих </a:t>
-            </a:r>
-            <a:r>
-              <a:rPr lang="ru-RU" sz="2000" dirty="0" smtClean="0"/>
-              <a:t>локациях. Настройка доступа проходит через </a:t>
-            </a:r>
-            <a:r>
-              <a:rPr lang="en-US" sz="2000" dirty="0" smtClean="0"/>
+              <a:t>Каждый гость, после регистрации получает доступ к определенной локации в доме, и может управлять только теми датчиками, которые находятся в этих локациях. </a:t>
+            </a:r>
+          </a:p>
+          <a:p>
+            <a:r>
+              <a:rPr lang="ru-RU" sz="2000" dirty="0"/>
+              <a:t>Настройка доступа проходит через </a:t>
+            </a:r>
+            <a:r>
+              <a:rPr lang="en-US" sz="2000" dirty="0"/>
               <a:t>Admin </a:t>
             </a:r>
             <a:r>
-              <a:rPr lang="ru-RU" sz="2000" dirty="0" smtClean="0"/>
+              <a:rPr lang="ru-RU" sz="2000" dirty="0"/>
               <a:t>панель</a:t>
             </a:r>
-            <a:endParaRPr lang="en-US" sz="2000" dirty="0" smtClean="0"/>
+            <a:endParaRPr lang="en-US" sz="2000" dirty="0"/>
           </a:p>
           <a:p>
             <a:endParaRPr lang="ru-RU" dirty="0"/>
@@ -3353,8 +3325,8 @@
         </p:blipFill>
         <p:spPr>
           <a:xfrm>
-            <a:off x="1907704" y="2276872"/>
-            <a:ext cx="5544616" cy="4032448"/>
+            <a:off x="4959124" y="980728"/>
+            <a:ext cx="6462657" cy="4700114"/>
           </a:xfrm>
           <a:prstGeom prst="rect">
             <a:avLst/>
@@ -3393,29 +3365,6 @@
       </p:grpSpPr>
       <p:sp>
         <p:nvSpPr>
-          <p:cNvPr id="2" name="Заголовок 1"/>
-          <p:cNvSpPr>
-            <a:spLocks noGrp="1"/>
-          </p:cNvSpPr>
-          <p:nvPr>
-            <p:ph type="title"/>
-          </p:nvPr>
-        </p:nvSpPr>
-        <p:spPr/>
-        <p:txBody>
-          <a:bodyPr/>
-          <a:lstStyle/>
-          <a:p>
-            <a:r>
-              <a:rPr lang="ru-RU" dirty="0" smtClean="0"/>
-              <a:t>Что реализовано в проекте</a:t>
-            </a:r>
-            <a:endParaRPr lang="ru-RU" dirty="0"/>
-          </a:p>
-        </p:txBody>
-      </p:sp>
-      <p:sp>
-        <p:nvSpPr>
           <p:cNvPr id="3" name="Объект 2"/>
           <p:cNvSpPr>
             <a:spLocks noGrp="1"/>
@@ -3424,38 +3373,116 @@
             <p:ph idx="1"/>
           </p:nvPr>
         </p:nvSpPr>
-        <p:spPr/>
-        <p:txBody>
-          <a:bodyPr/>
-          <a:lstStyle/>
-          <a:p>
-            <a:r>
-              <a:rPr lang="ru-RU" dirty="0" smtClean="0"/>
-              <a:t>Для </a:t>
-            </a:r>
-            <a:r>
-              <a:rPr lang="ru-RU" dirty="0"/>
-              <a:t>получения статуса датчика, выполнена настройка </a:t>
-            </a:r>
-            <a:r>
-              <a:rPr lang="en-US" dirty="0"/>
+        <p:spPr>
+          <a:xfrm>
+            <a:off x="623392" y="268497"/>
+            <a:ext cx="10972800" cy="936104"/>
+          </a:xfrm>
+        </p:spPr>
+        <p:txBody>
+          <a:bodyPr>
+            <a:normAutofit fontScale="85000" lnSpcReduction="20000"/>
+          </a:bodyPr>
+          <a:lstStyle/>
+          <a:p>
+            <a:r>
+              <a:rPr lang="ru-RU" sz="2400" dirty="0"/>
+              <a:t>Для получения статуса датчика, выполнена настройка </a:t>
+            </a:r>
+            <a:r>
+              <a:rPr lang="en-US" sz="2400" dirty="0"/>
               <a:t>celery</a:t>
             </a:r>
             <a:r>
-              <a:rPr lang="ru-RU" dirty="0"/>
+              <a:rPr lang="ru-RU" sz="2400" dirty="0"/>
               <a:t> с </a:t>
             </a:r>
             <a:r>
-              <a:rPr lang="en-US" dirty="0"/>
+              <a:rPr lang="en-US" sz="2400" dirty="0"/>
               <a:t>ping </a:t>
             </a:r>
             <a:r>
-              <a:rPr lang="ru-RU" dirty="0"/>
-              <a:t>датчика по расписанию, получения статуса датчика и записи статуса в базу.</a:t>
-            </a:r>
-          </a:p>
-        </p:txBody>
-      </p:sp>
+              <a:rPr lang="ru-RU" sz="2400" dirty="0"/>
+              <a:t>датчика по расписанию, получения статуса датчика и записи статуса в базу</a:t>
+            </a:r>
+            <a:r>
+              <a:rPr lang="ru-RU" sz="2400" dirty="0" smtClean="0"/>
+              <a:t>.</a:t>
+            </a:r>
+          </a:p>
+          <a:p>
+            <a:r>
+              <a:rPr lang="ru-RU" sz="2400" dirty="0" smtClean="0"/>
+              <a:t>Отображение статуса происходит на станице с перечнем датчиков</a:t>
+            </a:r>
+            <a:endParaRPr lang="ru-RU" sz="2400" dirty="0"/>
+          </a:p>
+        </p:txBody>
+      </p:sp>
+      <p:pic>
+        <p:nvPicPr>
+          <p:cNvPr id="4098" name="Picture 2"/>
+          <p:cNvPicPr>
+            <a:picLocks noChangeAspect="1" noChangeArrowheads="1"/>
+          </p:cNvPicPr>
+          <p:nvPr/>
+        </p:nvPicPr>
+        <p:blipFill>
+          <a:blip r:embed="rId2">
+            <a:extLst>
+              <a:ext uri="{28A0092B-C50C-407E-A947-70E740481C1C}">
+                <a14:useLocalDpi xmlns:a14="http://schemas.microsoft.com/office/drawing/2010/main" val="0"/>
+              </a:ext>
+            </a:extLst>
+          </a:blip>
+          <a:srcRect/>
+          <a:stretch>
+            <a:fillRect/>
+          </a:stretch>
+        </p:blipFill>
+        <p:spPr bwMode="auto">
+          <a:xfrm>
+            <a:off x="1991544" y="1196752"/>
+            <a:ext cx="7125549" cy="5517231"/>
+          </a:xfrm>
+          <a:prstGeom prst="rect">
+            <a:avLst/>
+          </a:prstGeom>
+          <a:noFill/>
+          <a:ln>
+            <a:noFill/>
+          </a:ln>
+          <a:effectLst/>
+          <a:extLst>
+            <a:ext uri="{909E8E84-426E-40DD-AFC4-6F175D3DCCD1}">
+              <a14:hiddenFill xmlns:a14="http://schemas.microsoft.com/office/drawing/2010/main">
+                <a:solidFill>
+                  <a:schemeClr val="accent1"/>
+                </a:solidFill>
+              </a14:hiddenFill>
+            </a:ext>
+            <a:ext uri="{91240B29-F687-4F45-9708-019B960494DF}">
+              <a14:hiddenLine xmlns:a14="http://schemas.microsoft.com/office/drawing/2010/main" w="9525">
+                <a:solidFill>
+                  <a:schemeClr val="tx1"/>
+                </a:solidFill>
+                <a:miter lim="800000"/>
+                <a:headEnd/>
+                <a:tailEnd/>
+              </a14:hiddenLine>
+            </a:ext>
+            <a:ext uri="{AF507438-7753-43E0-B8FC-AC1667EBCBE1}">
+              <a14:hiddenEffects xmlns:a14="http://schemas.microsoft.com/office/drawing/2010/main">
+                <a:effectLst>
+                  <a:outerShdw dist="35921" dir="2700000" algn="ctr" rotWithShape="0">
+                    <a:schemeClr val="bg2"/>
+                  </a:outerShdw>
+                </a:effectLst>
+              </a14:hiddenEffects>
+            </a:ext>
+          </a:extLst>
+        </p:spPr>
+      </p:pic>
     </p:spTree>
     <p:extLst>
       <p:ext uri="{BB962C8B-B14F-4D97-AF65-F5344CB8AC3E}">
@@ -3488,15 +3515,20 @@
       </p:grpSpPr>
       <p:sp>
         <p:nvSpPr>
-          <p:cNvPr id="2" name="Заголовок 1"/>
-          <p:cNvSpPr>
-            <a:spLocks noGrp="1"/>
-          </p:cNvSpPr>
-          <p:nvPr>
-            <p:ph type="title"/>
-          </p:nvPr>
-        </p:nvSpPr>
-        <p:spPr/>
+          <p:cNvPr id="3" name="Объект 2"/>
+          <p:cNvSpPr>
+            <a:spLocks noGrp="1"/>
+          </p:cNvSpPr>
+          <p:nvPr>
+            <p:ph idx="1"/>
+          </p:nvPr>
+        </p:nvSpPr>
+        <p:spPr>
+          <a:xfrm>
+            <a:off x="551384" y="268784"/>
+            <a:ext cx="5426620" cy="2664295"/>
+          </a:xfrm>
+        </p:spPr>
         <p:txBody>
           <a:bodyPr>
             <a:normAutofit/>
@@ -3504,75 +3536,81 @@
           <a:lstStyle/>
           <a:p>
             <a:r>
-              <a:rPr lang="ru-RU" dirty="0"/>
-              <a:t>В </a:t>
-            </a:r>
-            <a:r>
-              <a:rPr lang="en-US" dirty="0" smtClean="0"/>
-              <a:t>views.py </a:t>
-            </a:r>
-            <a:r>
-              <a:rPr lang="ru-RU" dirty="0"/>
-              <a:t>реализованы функции</a:t>
-            </a:r>
-            <a:r>
               <a:rPr lang="ru-RU" dirty="0" smtClean="0"/>
-              <a:t>:</a:t>
+              <a:t>При нажатии на датчик, попадаешь в панель с информацией о датчике и возможностью включения/выключения его</a:t>
             </a:r>
             <a:endParaRPr lang="ru-RU" dirty="0"/>
           </a:p>
         </p:txBody>
       </p:sp>
-      <p:sp>
-        <p:nvSpPr>
-          <p:cNvPr id="3" name="Объект 2"/>
-          <p:cNvSpPr>
-            <a:spLocks noGrp="1"/>
-          </p:cNvSpPr>
-          <p:nvPr>
-            <p:ph idx="1"/>
-          </p:nvPr>
-        </p:nvSpPr>
-        <p:spPr/>
-        <p:txBody>
-          <a:bodyPr/>
-          <a:lstStyle/>
-          <a:p>
-            <a:pPr lvl="0"/>
-            <a:r>
-              <a:rPr lang="ru-RU" dirty="0"/>
-              <a:t>- вывода всех сенсоров в зависимости от регистрации;</a:t>
-            </a:r>
-          </a:p>
-          <a:p>
-            <a:r>
-              <a:rPr lang="ru-RU" dirty="0"/>
-              <a:t>- вывод </a:t>
-            </a:r>
-            <a:r>
-              <a:rPr lang="en-US" dirty="0"/>
-              <a:t>IP</a:t>
-            </a:r>
-            <a:r>
-              <a:rPr lang="ru-RU" dirty="0"/>
-              <a:t> сенсора для отображения на страницах;</a:t>
-            </a:r>
-          </a:p>
-          <a:p>
-            <a:r>
-              <a:rPr lang="ru-RU" dirty="0"/>
-              <a:t>- функция непосредственного управления сенсором, передавая ему команды согласно документации сенсора;</a:t>
-            </a:r>
-          </a:p>
-          <a:p>
-            <a:endParaRPr lang="ru-RU" dirty="0"/>
-          </a:p>
-        </p:txBody>
-      </p:sp>
+      <p:pic>
+        <p:nvPicPr>
+          <p:cNvPr id="5122" name="Picture 2"/>
+          <p:cNvPicPr>
+            <a:picLocks noChangeAspect="1" noChangeArrowheads="1"/>
+          </p:cNvPicPr>
+          <p:nvPr/>
+        </p:nvPicPr>
+        <p:blipFill>
+          <a:blip r:embed="rId2">
+            <a:extLst>
+              <a:ext uri="{28A0092B-C50C-407E-A947-70E740481C1C}">
+                <a14:useLocalDpi xmlns:a14="http://schemas.microsoft.com/office/drawing/2010/main" val="0"/>
+              </a:ext>
+            </a:extLst>
+          </a:blip>
+          <a:srcRect/>
+          <a:stretch>
+            <a:fillRect/>
+          </a:stretch>
+        </p:blipFill>
+        <p:spPr bwMode="auto">
+          <a:xfrm>
+            <a:off x="5978004" y="260648"/>
+            <a:ext cx="5249391" cy="6285654"/>
+          </a:xfrm>
+          <a:prstGeom prst="rect">
+            <a:avLst/>
+          </a:prstGeom>
+          <a:noFill/>
+          <a:ln>
+            <a:noFill/>
+          </a:ln>
+          <a:effectLst/>
+          <a:extLst>
+            <a:ext uri="{909E8E84-426E-40DD-AFC4-6F175D3DCCD1}">
+              <a14:hiddenFill xmlns:a14="http://schemas.microsoft.com/office/drawing/2010/main">
+                <a:solidFill>
+                  <a:schemeClr val="accent1"/>
+                </a:solidFill>
+              </a14:hiddenFill>
+            </a:ext>
+            <a:ext uri="{91240B29-F687-4F45-9708-019B960494DF}">
+              <a14:hiddenLine xmlns:a14="http://schemas.microsoft.com/office/drawing/2010/main" w="9525">
+                <a:solidFill>
+                  <a:schemeClr val="tx1"/>
+                </a:solidFill>
+                <a:miter lim="800000"/>
+                <a:headEnd/>
+                <a:tailEnd/>
+              </a14:hiddenLine>
+            </a:ext>
+            <a:ext uri="{AF507438-7753-43E0-B8FC-AC1667EBCBE1}">
+              <a14:hiddenEffects xmlns:a14="http://schemas.microsoft.com/office/drawing/2010/main">
+                <a:effectLst>
+                  <a:outerShdw dist="35921" dir="2700000" algn="ctr" rotWithShape="0">
+                    <a:schemeClr val="bg2"/>
+                  </a:outerShdw>
+                </a:effectLst>
+              </a14:hiddenEffects>
+            </a:ext>
+          </a:extLst>
+        </p:spPr>
+      </p:pic>
     </p:spTree>
     <p:extLst>
       <p:ext uri="{BB962C8B-B14F-4D97-AF65-F5344CB8AC3E}">
-        <p14:creationId xmlns:p14="http://schemas.microsoft.com/office/powerpoint/2010/main" val="221932347"/>
+        <p14:creationId xmlns:p14="http://schemas.microsoft.com/office/powerpoint/2010/main" val="930794874"/>
       </p:ext>
     </p:extLst>
   </p:cSld>
@@ -3611,14 +3649,23 @@
         </p:nvSpPr>
         <p:spPr/>
         <p:txBody>
-          <a:bodyPr/>
-          <a:lstStyle/>
-          <a:p>
-            <a:r>
-              <a:rPr lang="ru-RU" dirty="0" smtClean="0"/>
-              <a:t>Что можно еще реализовать</a:t>
-            </a:r>
-            <a:endParaRPr lang="ru-RU" dirty="0"/>
+          <a:bodyPr>
+            <a:normAutofit/>
+          </a:bodyPr>
+          <a:lstStyle/>
+          <a:p>
+            <a:r>
+              <a:rPr lang="ru-RU" sz="3200" dirty="0"/>
+              <a:t>В </a:t>
+            </a:r>
+            <a:r>
+              <a:rPr lang="en-US" sz="3200" dirty="0"/>
+              <a:t>views.py </a:t>
+            </a:r>
+            <a:r>
+              <a:rPr lang="ru-RU" sz="3200" dirty="0"/>
+              <a:t>реализованы функции:</a:t>
+            </a:r>
           </a:p>
         </p:txBody>
       </p:sp>
@@ -3632,30 +3679,66 @@
             <p:ph idx="1"/>
           </p:nvPr>
         </p:nvSpPr>
-        <p:spPr/>
-        <p:txBody>
-          <a:bodyPr/>
-          <a:lstStyle/>
-          <a:p>
-            <a:r>
-              <a:rPr lang="ru-RU" dirty="0"/>
-              <a:t>в датчике есть возможность выставлять таймер освещения по дням недели, часам, </a:t>
-            </a:r>
-            <a:r>
-              <a:rPr lang="ru-RU" dirty="0" smtClean="0"/>
-              <a:t>с обратным </a:t>
-            </a:r>
-            <a:r>
-              <a:rPr lang="ru-RU" dirty="0"/>
-              <a:t>отсчетом, привязываться к восходу и закату солнца. Так же можно реализовать управление датчиками через телеграмм бота. Этим я займусь чуть позже.</a:t>
-            </a:r>
+        <p:spPr>
+          <a:xfrm>
+            <a:off x="1271464" y="2496345"/>
+            <a:ext cx="9649072" cy="2660847"/>
+          </a:xfrm>
+        </p:spPr>
+        <p:txBody>
+          <a:bodyPr>
+            <a:normAutofit/>
+          </a:bodyPr>
+          <a:lstStyle/>
+          <a:p>
+            <a:pPr lvl="0"/>
+            <a:r>
+              <a:rPr lang="ru-RU" sz="2400" dirty="0"/>
+              <a:t>вывода всех сенсоров в зависимости от регистрации;</a:t>
+            </a:r>
+          </a:p>
+          <a:p>
+            <a:r>
+              <a:rPr lang="ru-RU" sz="2400" dirty="0"/>
+              <a:t>вывод </a:t>
+            </a:r>
+            <a:r>
+              <a:rPr lang="en-US" sz="2400" dirty="0"/>
+              <a:t>IP</a:t>
+            </a:r>
+            <a:r>
+              <a:rPr lang="ru-RU" sz="2400" dirty="0"/>
+              <a:t> сенсора для отображения на страницах;</a:t>
+            </a:r>
+          </a:p>
+          <a:p>
+            <a:r>
+              <a:rPr lang="ru-RU" sz="2400" dirty="0"/>
+              <a:t>функция непосредственного управления </a:t>
+            </a:r>
+            <a:r>
+              <a:rPr lang="ru-RU" sz="2400" dirty="0" smtClean="0"/>
+              <a:t>сенсором через </a:t>
+            </a:r>
+            <a:r>
+              <a:rPr lang="ru-RU" sz="2400" dirty="0"/>
+              <a:t>HTTP протокол</a:t>
+            </a:r>
+            <a:r>
+              <a:rPr lang="ru-RU" sz="2400" dirty="0" smtClean="0"/>
+              <a:t>;</a:t>
+            </a:r>
+            <a:endParaRPr lang="ru-RU" sz="2400" dirty="0"/>
+          </a:p>
+          <a:p>
+            <a:endParaRPr lang="ru-RU" sz="2400" dirty="0"/>
           </a:p>
         </p:txBody>
       </p:sp>
     </p:spTree>
     <p:extLst>
       <p:ext uri="{BB962C8B-B14F-4D97-AF65-F5344CB8AC3E}">
-        <p14:creationId xmlns:p14="http://schemas.microsoft.com/office/powerpoint/2010/main" val="2003825017"/>
+        <p14:creationId xmlns:p14="http://schemas.microsoft.com/office/powerpoint/2010/main" val="221932347"/>
       </p:ext>
     </p:extLst>
   </p:cSld>
@@ -3682,51 +3765,149 @@
           <a:chExt cx="0" cy="0"/>
         </a:xfrm>
       </p:grpSpPr>
-      <p:pic>
-        <p:nvPicPr>
-          <p:cNvPr id="1026" name="Picture 2" descr="D:\it\On_OFF_sensor\static\images\House_page.jpg"/>
-          <p:cNvPicPr>
-            <a:picLocks noChangeAspect="1" noChangeArrowheads="1"/>
-          </p:cNvPicPr>
-          <p:nvPr/>
-        </p:nvPicPr>
-        <p:blipFill>
-          <a:blip r:embed="rId2">
-            <a:extLst>
-              <a:ext uri="{28A0092B-C50C-407E-A947-70E740481C1C}">
-                <a14:useLocalDpi xmlns:a14="http://schemas.microsoft.com/office/drawing/2010/main" val="0"/>
-              </a:ext>
-            </a:extLst>
-          </a:blip>
-          <a:srcRect/>
-          <a:stretch>
-            <a:fillRect/>
-          </a:stretch>
-        </p:blipFill>
-        <p:spPr bwMode="auto">
+      <p:sp>
+        <p:nvSpPr>
+          <p:cNvPr id="2" name="Заголовок 1"/>
+          <p:cNvSpPr>
+            <a:spLocks noGrp="1"/>
+          </p:cNvSpPr>
+          <p:nvPr>
+            <p:ph type="title"/>
+          </p:nvPr>
+        </p:nvSpPr>
+        <p:spPr/>
+        <p:txBody>
+          <a:bodyPr>
+            <a:normAutofit/>
+          </a:bodyPr>
+          <a:lstStyle/>
+          <a:p>
+            <a:r>
+              <a:rPr lang="ru-RU" sz="3200" dirty="0"/>
+              <a:t>Что можно еще реализовать</a:t>
+            </a:r>
+          </a:p>
+        </p:txBody>
+      </p:sp>
+      <p:sp>
+        <p:nvSpPr>
+          <p:cNvPr id="3" name="Объект 2"/>
+          <p:cNvSpPr>
+            <a:spLocks noGrp="1"/>
+          </p:cNvSpPr>
+          <p:nvPr>
+            <p:ph idx="1"/>
+          </p:nvPr>
+        </p:nvSpPr>
+        <p:spPr>
           <a:xfrm>
-            <a:off x="1403648" y="260648"/>
-            <a:ext cx="5976664" cy="6320716"/>
+            <a:off x="911424" y="2708920"/>
+            <a:ext cx="10369152" cy="2520280"/>
           </a:xfrm>
-          <a:prstGeom prst="rect">
-            <a:avLst/>
-          </a:prstGeom>
-          <a:noFill/>
-          <a:extLst>
-            <a:ext uri="{909E8E84-426E-40DD-AFC4-6F175D3DCCD1}">
-              <a14:hiddenFill xmlns:a14="http://schemas.microsoft.com/office/drawing/2010/main">
-                <a:solidFill>
-                  <a:srgbClr val="FFFFFF"/>
-                </a:solidFill>
-              </a14:hiddenFill>
-            </a:ext>
-          </a:extLst>
         </p:spPr>
-      </p:pic>
+        <p:txBody>
+          <a:bodyPr>
+            <a:normAutofit/>
+          </a:bodyPr>
+          <a:lstStyle/>
+          <a:p>
+            <a:pPr marL="0" indent="357188">
+              <a:buNone/>
+            </a:pPr>
+            <a:r>
+              <a:rPr lang="ru-RU" sz="2400" dirty="0"/>
+              <a:t>В датчике есть возможность выставлять таймер освещения по дням недели, часам, с обратным отсчетом, привязываться к восходу и закату солнца. </a:t>
+            </a:r>
+          </a:p>
+          <a:p>
+            <a:pPr marL="0" indent="357188">
+              <a:buNone/>
+            </a:pPr>
+            <a:r>
+              <a:rPr lang="ru-RU" sz="2400" dirty="0"/>
+              <a:t>Также можно реализовать управление датчиками через телеграмм бота. </a:t>
+            </a:r>
+          </a:p>
+          <a:p>
+            <a:pPr marL="0" indent="357188">
+              <a:buNone/>
+            </a:pPr>
+            <a:r>
+              <a:rPr lang="ru-RU" sz="2400" dirty="0"/>
+              <a:t>Этим я займусь чуть позже.</a:t>
+            </a:r>
+          </a:p>
+        </p:txBody>
+      </p:sp>
     </p:spTree>
     <p:extLst>
       <p:ext uri="{BB962C8B-B14F-4D97-AF65-F5344CB8AC3E}">
-        <p14:creationId xmlns:p14="http://schemas.microsoft.com/office/powerpoint/2010/main" val="401016298"/>
+        <p14:creationId xmlns:p14="http://schemas.microsoft.com/office/powerpoint/2010/main" val="2003825017"/>
+      </p:ext>
+    </p:extLst>
+  </p:cSld>
+  <p:clrMapOvr>
+    <a:masterClrMapping/>
+  </p:clrMapOvr>
+</p:sld>
+</file>
+
+<file path=ppt/slides/slide15.xml><?xml version="1.0" encoding="utf-8"?>
+<p:sld xmlns:a="http://schemas.openxmlformats.org/drawingml/2006/main" xmlns:r="http://schemas.openxmlformats.org/officeDocument/2006/relationships" xmlns:p="http://schemas.openxmlformats.org/presentationml/2006/main">
+  <p:cSld>
+    <p:spTree>
+      <p:nvGrpSpPr>
+        <p:cNvPr id="1" name=""/>
+        <p:cNvGrpSpPr/>
+        <p:nvPr/>
+      </p:nvGrpSpPr>
+      <p:grpSpPr>
+        <a:xfrm>
+          <a:off x="0" y="0"/>
+          <a:ext cx="0" cy="0"/>
+          <a:chOff x="0" y="0"/>
+          <a:chExt cx="0" cy="0"/>
+        </a:xfrm>
+      </p:grpSpPr>
+      <p:sp>
+        <p:nvSpPr>
+          <p:cNvPr id="5" name="Заголовок 1">
+            <a:extLst>
+              <a:ext uri="{FF2B5EF4-FFF2-40B4-BE49-F238E27FC236}">
+                <a16:creationId xmlns="" xmlns:a16="http://schemas.microsoft.com/office/drawing/2014/main" id="{A3E28784-EBFF-47F6-9E62-F5FA6C5E8EFE}"/>
+              </a:ext>
+            </a:extLst>
+          </p:cNvPr>
+          <p:cNvSpPr>
+            <a:spLocks noGrp="1"/>
+          </p:cNvSpPr>
+          <p:nvPr>
+            <p:ph type="title"/>
+          </p:nvPr>
+        </p:nvSpPr>
+        <p:spPr>
+          <a:xfrm>
+            <a:off x="609600" y="2857500"/>
+            <a:ext cx="10972800" cy="1143000"/>
+          </a:xfrm>
+        </p:spPr>
+        <p:txBody>
+          <a:bodyPr>
+            <a:normAutofit/>
+          </a:bodyPr>
+          <a:lstStyle/>
+          <a:p>
+            <a:r>
+              <a:rPr lang="ru-RU" sz="3200" dirty="0"/>
+              <a:t>Спасибо за внимание!</a:t>
+            </a:r>
+          </a:p>
+        </p:txBody>
+      </p:sp>
+    </p:spTree>
+    <p:extLst>
+      <p:ext uri="{BB962C8B-B14F-4D97-AF65-F5344CB8AC3E}">
+        <p14:creationId xmlns:p14="http://schemas.microsoft.com/office/powerpoint/2010/main" val="2161787026"/>
       </p:ext>
     </p:extLst>
   </p:cSld>
@@ -3763,17 +3944,22 @@
             <p:ph type="title"/>
           </p:nvPr>
         </p:nvSpPr>
-        <p:spPr/>
-        <p:txBody>
-          <a:bodyPr/>
-          <a:lstStyle/>
-          <a:p>
-            <a:pPr algn="l"/>
-            <a:r>
-              <a:rPr lang="ru-RU" dirty="0" smtClean="0"/>
+        <p:spPr>
+          <a:xfrm>
+            <a:off x="609600" y="274638"/>
+            <a:ext cx="6638528" cy="1143000"/>
+          </a:xfrm>
+        </p:spPr>
+        <p:txBody>
+          <a:bodyPr>
+            <a:normAutofit/>
+          </a:bodyPr>
+          <a:lstStyle/>
+          <a:p>
+            <a:r>
+              <a:rPr lang="ru-RU" sz="3200" dirty="0"/>
               <a:t>Идея проекта</a:t>
             </a:r>
-            <a:endParaRPr lang="ru-RU" dirty="0"/>
           </a:p>
         </p:txBody>
       </p:sp>
@@ -3787,23 +3973,78 @@
             <p:ph idx="1"/>
           </p:nvPr>
         </p:nvSpPr>
-        <p:spPr/>
-        <p:txBody>
-          <a:bodyPr/>
-          <a:lstStyle/>
-          <a:p>
-            <a:r>
-              <a:rPr lang="ru-RU" dirty="0"/>
-              <a:t>с помощью простого WI-FI датчика c размерами 4х4х2 см и стоимостью порядка 5</a:t>
-            </a:r>
-            <a:r>
-              <a:rPr lang="ru-RU" dirty="0" smtClean="0"/>
-              <a:t>$, возможно реализовать умный дом</a:t>
-            </a:r>
-            <a:endParaRPr lang="ru-RU" dirty="0"/>
-          </a:p>
-        </p:txBody>
-      </p:sp>
+        <p:spPr>
+          <a:xfrm>
+            <a:off x="479376" y="1700808"/>
+            <a:ext cx="3312368" cy="3528392"/>
+          </a:xfrm>
+        </p:spPr>
+        <p:txBody>
+          <a:bodyPr>
+            <a:normAutofit/>
+          </a:bodyPr>
+          <a:lstStyle/>
+          <a:p>
+            <a:r>
+              <a:rPr lang="ru-RU" sz="2400" dirty="0"/>
+              <a:t>с помощью простого WI-FI датчика c размерами 4х4х2 см и стоимостью порядка </a:t>
+            </a:r>
+            <a:r>
+              <a:rPr lang="en-US" sz="2400" dirty="0"/>
+              <a:t>$</a:t>
+            </a:r>
+            <a:r>
+              <a:rPr lang="ru-RU" sz="2400" dirty="0" smtClean="0"/>
+              <a:t>5, </a:t>
+            </a:r>
+            <a:r>
+              <a:rPr lang="ru-RU" sz="2400" dirty="0"/>
+              <a:t>возможно реализовать умный дом</a:t>
+            </a:r>
+          </a:p>
+        </p:txBody>
+      </p:sp>
+      <p:pic>
+        <p:nvPicPr>
+          <p:cNvPr id="1026" name="Picture 2" descr="C:\Users\user\Desktop\House_page.jpg"/>
+          <p:cNvPicPr>
+            <a:picLocks noChangeAspect="1" noChangeArrowheads="1"/>
+          </p:cNvPicPr>
+          <p:nvPr/>
+        </p:nvPicPr>
+        <p:blipFill>
+          <a:blip r:embed="rId2" cstate="print">
+            <a:extLst>
+              <a:ext uri="{28A0092B-C50C-407E-A947-70E740481C1C}">
+                <a14:useLocalDpi xmlns:a14="http://schemas.microsoft.com/office/drawing/2010/main" val="0"/>
+              </a:ext>
+            </a:extLst>
+          </a:blip>
+          <a:srcRect/>
+          <a:stretch>
+            <a:fillRect/>
+          </a:stretch>
+        </p:blipFill>
+        <p:spPr bwMode="auto">
+          <a:xfrm>
+            <a:off x="6023992" y="332656"/>
+            <a:ext cx="5767136" cy="6099125"/>
+          </a:xfrm>
+          <a:prstGeom prst="rect">
+            <a:avLst/>
+          </a:prstGeom>
+          <a:noFill/>
+          <a:extLst>
+            <a:ext uri="{909E8E84-426E-40DD-AFC4-6F175D3DCCD1}">
+              <a14:hiddenFill xmlns:a14="http://schemas.microsoft.com/office/drawing/2010/main">
+                <a:solidFill>
+                  <a:srgbClr val="FFFFFF"/>
+                </a:solidFill>
+              </a14:hiddenFill>
+            </a:ext>
+          </a:extLst>
+        </p:spPr>
+      </p:pic>
     </p:spTree>
     <p:extLst>
       <p:ext uri="{BB962C8B-B14F-4D97-AF65-F5344CB8AC3E}">
@@ -3847,15 +4088,14 @@
         <p:spPr/>
         <p:txBody>
           <a:bodyPr>
-            <a:normAutofit fontScale="90000"/>
+            <a:normAutofit/>
           </a:bodyPr>
           <a:lstStyle/>
           <a:p>
             <a:r>
-              <a:rPr lang="ru-RU" dirty="0" smtClean="0"/>
+              <a:rPr lang="ru-RU" sz="3200" dirty="0"/>
               <a:t>Преимущества данного оборудования</a:t>
             </a:r>
-            <a:endParaRPr lang="ru-RU" dirty="0"/>
           </a:p>
         </p:txBody>
       </p:sp>
@@ -3871,8 +4111,8 @@
         </p:nvSpPr>
         <p:spPr>
           <a:xfrm>
-            <a:off x="457200" y="1600200"/>
-            <a:ext cx="8363272" cy="4525963"/>
+            <a:off x="1199456" y="2622922"/>
+            <a:ext cx="9793088" cy="2390254"/>
           </a:xfrm>
         </p:spPr>
         <p:txBody>
@@ -3882,30 +4122,38 @@
           <a:lstStyle/>
           <a:p>
             <a:r>
-              <a:rPr lang="ru-RU" dirty="0" smtClean="0"/>
+              <a:rPr lang="ru-RU" sz="2400" dirty="0"/>
               <a:t>Возможность реализовать умный дом, в уже построенных и обжитых помещениях с минимальными ремонтными работами и затратами</a:t>
             </a:r>
           </a:p>
           <a:p>
             <a:r>
-              <a:rPr lang="ru-RU" dirty="0" smtClean="0"/>
+              <a:rPr lang="ru-RU" sz="2400" dirty="0"/>
               <a:t>Из-за своих размеров, датчик помещается в </a:t>
             </a:r>
             <a:r>
-              <a:rPr lang="ru-RU" dirty="0" err="1" smtClean="0"/>
+              <a:rPr lang="ru-RU" sz="2400" dirty="0" err="1"/>
               <a:t>подрозетник</a:t>
             </a:r>
             <a:r>
-              <a:rPr lang="ru-RU" dirty="0" smtClean="0"/>
-              <a:t> и коробку распределительную.</a:t>
-            </a:r>
-          </a:p>
-          <a:p>
-            <a:r>
-              <a:rPr lang="ru-RU" dirty="0" smtClean="0"/>
+              <a:rPr lang="ru-RU" sz="2400" dirty="0"/>
+              <a:t> и </a:t>
+            </a:r>
+            <a:r>
+              <a:rPr lang="ru-RU" sz="2400" dirty="0"/>
+              <a:t>распределительную </a:t>
+            </a:r>
+            <a:r>
+              <a:rPr lang="ru-RU" sz="2400" dirty="0" smtClean="0"/>
+              <a:t>коробку</a:t>
+            </a:r>
+            <a:endParaRPr lang="ru-RU" sz="2400" dirty="0"/>
+          </a:p>
+          <a:p>
+            <a:r>
+              <a:rPr lang="ru-RU" sz="2400" dirty="0"/>
               <a:t>Не требуется прокладка кабеля и установка серверного оборудования</a:t>
             </a:r>
-            <a:endParaRPr lang="ru-RU" dirty="0"/>
           </a:p>
         </p:txBody>
       </p:sp>
@@ -3951,21 +4199,20 @@
         </p:nvSpPr>
         <p:spPr>
           <a:xfrm>
-            <a:off x="457200" y="274638"/>
+            <a:off x="1981200" y="274638"/>
             <a:ext cx="8229600" cy="1426170"/>
           </a:xfrm>
         </p:spPr>
         <p:txBody>
           <a:bodyPr>
-            <a:normAutofit fontScale="90000"/>
+            <a:noAutofit/>
           </a:bodyPr>
           <a:lstStyle/>
           <a:p>
             <a:r>
-              <a:rPr lang="ru-RU" dirty="0" smtClean="0"/>
+              <a:rPr lang="ru-RU" sz="3200" dirty="0"/>
               <a:t>Область применения разработанного программного обеспечения</a:t>
             </a:r>
-            <a:endParaRPr lang="ru-RU" dirty="0"/>
           </a:p>
         </p:txBody>
       </p:sp>
@@ -3981,57 +4228,57 @@
         </p:nvSpPr>
         <p:spPr>
           <a:xfrm>
-            <a:off x="457200" y="1988840"/>
-            <a:ext cx="8229600" cy="4137323"/>
+            <a:off x="767408" y="2348880"/>
+            <a:ext cx="10657184" cy="4137323"/>
           </a:xfrm>
         </p:spPr>
         <p:txBody>
           <a:bodyPr>
-            <a:normAutofit fontScale="77500" lnSpcReduction="20000"/>
+            <a:normAutofit/>
           </a:bodyPr>
           <a:lstStyle/>
           <a:p>
             <a:r>
-              <a:rPr lang="ru-RU" dirty="0"/>
+              <a:rPr lang="ru-RU" sz="2400" dirty="0"/>
               <a:t>Имеется база отдыха с множеством гостевых домов и комнат.</a:t>
             </a:r>
           </a:p>
           <a:p>
             <a:r>
-              <a:rPr lang="ru-RU" dirty="0"/>
+              <a:rPr lang="ru-RU" sz="2400" dirty="0"/>
               <a:t>В каждой комнате имеется много потребителей электричества, таких как: свет верхний, торшер, утюг, чайник и т.д.  </a:t>
             </a:r>
           </a:p>
           <a:p>
             <a:r>
-              <a:rPr lang="ru-RU" dirty="0"/>
+              <a:rPr lang="ru-RU" sz="2400" dirty="0"/>
               <a:t>При заселении в дом отдыха, каждый гость регистрируется на сайте дома отдыха, администратор вносит локации, которые будут доступны гостю, для управления электроприборами.</a:t>
             </a:r>
           </a:p>
           <a:p>
             <a:r>
-              <a:rPr lang="ru-RU" dirty="0"/>
+              <a:rPr lang="ru-RU" sz="2400" dirty="0"/>
               <a:t>Так же программа, может работать в частных домах, квартирах, офисах везде, где есть сеть </a:t>
             </a:r>
             <a:r>
-              <a:rPr lang="en-US" dirty="0"/>
+              <a:rPr lang="en-US" sz="2400" dirty="0"/>
               <a:t>WI</a:t>
             </a:r>
             <a:r>
-              <a:rPr lang="ru-RU" dirty="0"/>
+              <a:rPr lang="ru-RU" sz="2400" dirty="0"/>
               <a:t>-</a:t>
             </a:r>
             <a:r>
-              <a:rPr lang="en-US" dirty="0"/>
+              <a:rPr lang="en-US" sz="2400" dirty="0"/>
               <a:t>FI </a:t>
             </a:r>
             <a:r>
-              <a:rPr lang="ru-RU" dirty="0"/>
+              <a:rPr lang="ru-RU" sz="2400" dirty="0"/>
               <a:t>и приборы потребления электричества.</a:t>
             </a:r>
           </a:p>
           <a:p>
-            <a:endParaRPr lang="ru-RU" dirty="0"/>
+            <a:endParaRPr lang="ru-RU" sz="2400" dirty="0"/>
           </a:p>
         </p:txBody>
       </p:sp>
@@ -4075,16 +4322,22 @@
             <p:ph type="title"/>
           </p:nvPr>
         </p:nvSpPr>
-        <p:spPr/>
-        <p:txBody>
-          <a:bodyPr/>
-          <a:lstStyle/>
-          <a:p>
-            <a:r>
-              <a:rPr lang="ru-RU" dirty="0" smtClean="0"/>
+        <p:spPr>
+          <a:xfrm>
+            <a:off x="609600" y="274638"/>
+            <a:ext cx="10972800" cy="490066"/>
+          </a:xfrm>
+        </p:spPr>
+        <p:txBody>
+          <a:bodyPr>
+            <a:normAutofit fontScale="90000"/>
+          </a:bodyPr>
+          <a:lstStyle/>
+          <a:p>
+            <a:r>
+              <a:rPr lang="ru-RU" sz="3200" dirty="0"/>
               <a:t>Что реализовано в проекте</a:t>
             </a:r>
-            <a:endParaRPr lang="ru-RU" dirty="0"/>
           </a:p>
         </p:txBody>
       </p:sp>
@@ -4098,7 +4351,12 @@
             <p:ph idx="1"/>
           </p:nvPr>
         </p:nvSpPr>
-        <p:spPr/>
+        <p:spPr>
+          <a:xfrm>
+            <a:off x="479376" y="764704"/>
+            <a:ext cx="11521280" cy="5544616"/>
+          </a:xfrm>
+        </p:spPr>
         <p:txBody>
           <a:bodyPr>
             <a:normAutofit/>
@@ -4106,58 +4364,206 @@
           <a:lstStyle/>
           <a:p>
             <a:r>
-              <a:rPr lang="ru-RU" sz="2800" dirty="0" smtClean="0"/>
+              <a:rPr lang="ru-RU" sz="2400" dirty="0"/>
               <a:t>Настроен </a:t>
             </a:r>
             <a:r>
-              <a:rPr lang="en-US" sz="2800" dirty="0" err="1" smtClean="0"/>
+              <a:rPr lang="en-US" sz="2400" dirty="0" err="1"/>
               <a:t>Django</a:t>
             </a:r>
             <a:r>
-              <a:rPr lang="en-US" sz="2800" dirty="0" smtClean="0"/>
+              <a:rPr lang="en-US" sz="2400" dirty="0"/>
               <a:t> </a:t>
             </a:r>
             <a:r>
-              <a:rPr lang="ru-RU" sz="2800" dirty="0" smtClean="0"/>
+              <a:rPr lang="ru-RU" sz="2400" dirty="0"/>
               <a:t>сервер</a:t>
             </a:r>
           </a:p>
           <a:p>
             <a:r>
-              <a:rPr lang="ru-RU" sz="2800" dirty="0" smtClean="0"/>
-              <a:t>Добавлены страницы управления сайтом</a:t>
-            </a:r>
+              <a:rPr lang="ru-RU" sz="2400" dirty="0"/>
+              <a:t>Добавлены страницы управления </a:t>
+            </a:r>
+            <a:r>
+              <a:rPr lang="ru-RU" sz="2400" dirty="0" smtClean="0"/>
+              <a:t>сайтом</a:t>
+            </a:r>
+            <a:endParaRPr lang="en-US" sz="2400" dirty="0" smtClean="0"/>
+          </a:p>
+          <a:p>
+            <a:r>
+              <a:rPr lang="ru-RU" sz="2400" dirty="0"/>
+              <a:t>Реализована регистрация гостей на сайте, с помощью </a:t>
+            </a:r>
+            <a:r>
+              <a:rPr lang="ru-RU" sz="2400" dirty="0" err="1"/>
+              <a:t>Django</a:t>
+            </a:r>
+            <a:r>
+              <a:rPr lang="ru-RU" sz="2400" dirty="0"/>
+              <a:t> </a:t>
+            </a:r>
+            <a:r>
+              <a:rPr lang="ru-RU" sz="2400" dirty="0" err="1"/>
+              <a:t>Crispy</a:t>
+            </a:r>
+            <a:r>
+              <a:rPr lang="ru-RU" sz="2400" dirty="0"/>
+              <a:t> </a:t>
+            </a:r>
+            <a:r>
+              <a:rPr lang="ru-RU" sz="2400" dirty="0" err="1"/>
+              <a:t>Forms</a:t>
+            </a:r>
+            <a:r>
+              <a:rPr lang="ru-RU" sz="2400" dirty="0"/>
+              <a:t>. </a:t>
+            </a:r>
+            <a:endParaRPr lang="en-US" sz="2400" dirty="0" smtClean="0"/>
+          </a:p>
+          <a:p>
+            <a:pPr lvl="0"/>
+            <a:r>
+              <a:rPr lang="ru-RU" sz="2400" dirty="0"/>
+              <a:t>Настроены страницы регистрации, </a:t>
+            </a:r>
+            <a:r>
+              <a:rPr lang="en-US" sz="2400" dirty="0"/>
+              <a:t>Login</a:t>
+            </a:r>
+            <a:r>
+              <a:rPr lang="ru-RU" sz="2400" dirty="0"/>
+              <a:t>, </a:t>
+            </a:r>
+            <a:r>
+              <a:rPr lang="en-US" sz="2400" dirty="0"/>
+              <a:t>Logout</a:t>
+            </a:r>
+            <a:r>
+              <a:rPr lang="ru-RU" sz="2400" dirty="0"/>
+              <a:t>, страница профиля гостя, с возможностью смены </a:t>
+            </a:r>
+            <a:r>
+              <a:rPr lang="ru-RU" sz="2400" dirty="0" smtClean="0"/>
+              <a:t>имени</a:t>
+            </a:r>
+            <a:endParaRPr lang="en-US" sz="2400" dirty="0" smtClean="0"/>
+          </a:p>
+          <a:p>
+            <a:pPr lvl="0"/>
+            <a:r>
+              <a:rPr lang="ru-RU" sz="2400" dirty="0"/>
+              <a:t>Заполнение базы данных реализовано с помощью </a:t>
+            </a:r>
+            <a:r>
+              <a:rPr lang="ru-RU" sz="2400" dirty="0" err="1"/>
+              <a:t>фикстур</a:t>
+            </a:r>
+            <a:r>
+              <a:rPr lang="ru-RU" sz="2400" dirty="0"/>
+              <a:t> в </a:t>
+            </a:r>
+            <a:r>
+              <a:rPr lang="ru-RU" sz="2400" dirty="0" err="1"/>
+              <a:t>Django</a:t>
+            </a:r>
+            <a:r>
+              <a:rPr lang="ru-RU" sz="2400" dirty="0" smtClean="0"/>
+              <a:t>.</a:t>
+            </a:r>
+            <a:endParaRPr lang="en-US" sz="2400" dirty="0" smtClean="0"/>
+          </a:p>
+          <a:p>
+            <a:r>
+              <a:rPr lang="ru-RU" sz="2400" dirty="0"/>
+              <a:t>Настроена </a:t>
+            </a:r>
+            <a:r>
+              <a:rPr lang="en-US" sz="2400" dirty="0"/>
+              <a:t>Admin </a:t>
+            </a:r>
+            <a:r>
+              <a:rPr lang="ru-RU" sz="2400" dirty="0"/>
+              <a:t>панель, для</a:t>
+            </a:r>
+            <a:r>
+              <a:rPr lang="en-US" sz="2400" dirty="0"/>
+              <a:t> </a:t>
+            </a:r>
+            <a:r>
+              <a:rPr lang="ru-RU" sz="2400" dirty="0"/>
+              <a:t>отображения всей информации по датчикам и </a:t>
+            </a:r>
+            <a:r>
+              <a:rPr lang="ru-RU" sz="2400" dirty="0" smtClean="0"/>
+              <a:t>локациям</a:t>
+            </a:r>
+            <a:endParaRPr lang="en-US" sz="2400" dirty="0" smtClean="0"/>
+          </a:p>
+          <a:p>
+            <a:r>
+              <a:rPr lang="ru-RU" sz="2400" dirty="0"/>
+              <a:t>Для получения статуса датчика, выполнена настройка </a:t>
+            </a:r>
+            <a:r>
+              <a:rPr lang="en-US" sz="2400" dirty="0" smtClean="0"/>
+              <a:t>celery</a:t>
+            </a:r>
+          </a:p>
+          <a:p>
+            <a:r>
+              <a:rPr lang="ru-RU" sz="2400" dirty="0"/>
+              <a:t>Удаленное управление датчиками через HTTP </a:t>
+            </a:r>
+            <a:r>
+              <a:rPr lang="ru-RU" sz="2400" dirty="0" smtClean="0"/>
+              <a:t>протокол</a:t>
+            </a:r>
+            <a:endParaRPr lang="en-US" sz="2400" dirty="0" smtClean="0"/>
+          </a:p>
+          <a:p>
+            <a:endParaRPr lang="en-US" sz="2400" dirty="0"/>
+          </a:p>
+          <a:p>
+            <a:pPr marL="0" indent="0" algn="ctr">
+              <a:buNone/>
+            </a:pPr>
+            <a:r>
+              <a:rPr lang="ru-RU" sz="2400" dirty="0" smtClean="0">
+                <a:solidFill>
+                  <a:srgbClr val="00B0F0"/>
+                </a:solidFill>
+              </a:rPr>
+              <a:t>Далее немного подробнее о реализации проекта</a:t>
+            </a:r>
+            <a:endParaRPr lang="ru-RU" sz="2400" dirty="0">
+              <a:solidFill>
+                <a:srgbClr val="00B0F0"/>
+              </a:solidFill>
+            </a:endParaRPr>
+          </a:p>
+          <a:p>
+            <a:endParaRPr lang="en-US" sz="2000" dirty="0"/>
+          </a:p>
+          <a:p>
+            <a:pPr lvl="0"/>
+            <a:endParaRPr lang="ru-RU" sz="2800" dirty="0"/>
+          </a:p>
+          <a:p>
+            <a:endParaRPr lang="en-US" sz="2800" dirty="0" smtClean="0"/>
+          </a:p>
+          <a:p>
+            <a:endParaRPr lang="ru-RU" sz="2800" dirty="0"/>
           </a:p>
           <a:p>
             <a:endParaRPr lang="ru-RU" sz="2400" dirty="0"/>
           </a:p>
           <a:p>
-            <a:endParaRPr lang="ru-RU" sz="2400" dirty="0" smtClean="0"/>
-          </a:p>
-        </p:txBody>
-      </p:sp>
-      <p:pic>
-        <p:nvPicPr>
-          <p:cNvPr id="4" name="Рисунок 3"/>
-          <p:cNvPicPr/>
-          <p:nvPr/>
-        </p:nvPicPr>
-        <p:blipFill>
-          <a:blip r:embed="rId2"/>
-          <a:stretch>
-            <a:fillRect/>
-          </a:stretch>
-        </p:blipFill>
-        <p:spPr>
-          <a:xfrm>
-            <a:off x="827584" y="2862058"/>
-            <a:ext cx="6294065" cy="817240"/>
-          </a:xfrm>
-          <a:prstGeom prst="rect">
-            <a:avLst/>
-          </a:prstGeom>
-        </p:spPr>
-      </p:pic>
+            <a:endParaRPr lang="ru-RU" sz="2400" dirty="0"/>
+          </a:p>
+        </p:txBody>
+      </p:sp>
     </p:spTree>
     <p:extLst>
       <p:ext uri="{BB962C8B-B14F-4D97-AF65-F5344CB8AC3E}">
@@ -4190,97 +4596,86 @@
       </p:grpSpPr>
       <p:sp>
         <p:nvSpPr>
-          <p:cNvPr id="2" name="Заголовок 1"/>
-          <p:cNvSpPr>
-            <a:spLocks noGrp="1"/>
-          </p:cNvSpPr>
-          <p:nvPr>
-            <p:ph type="title"/>
-          </p:nvPr>
-        </p:nvSpPr>
-        <p:spPr/>
+          <p:cNvPr id="3" name="Объект 2"/>
+          <p:cNvSpPr>
+            <a:spLocks noGrp="1"/>
+          </p:cNvSpPr>
+          <p:nvPr>
+            <p:ph idx="1"/>
+          </p:nvPr>
+        </p:nvSpPr>
+        <p:spPr>
+          <a:xfrm>
+            <a:off x="609600" y="575696"/>
+            <a:ext cx="10972800" cy="4525963"/>
+          </a:xfrm>
+        </p:spPr>
         <p:txBody>
           <a:bodyPr/>
           <a:lstStyle/>
           <a:p>
-            <a:r>
-              <a:rPr lang="ru-RU" dirty="0" smtClean="0"/>
-              <a:t>Что реализовано в проекте</a:t>
-            </a:r>
-            <a:endParaRPr lang="ru-RU" dirty="0"/>
-          </a:p>
-        </p:txBody>
-      </p:sp>
-      <p:sp>
-        <p:nvSpPr>
-          <p:cNvPr id="3" name="Объект 2"/>
-          <p:cNvSpPr>
-            <a:spLocks noGrp="1"/>
-          </p:cNvSpPr>
-          <p:nvPr>
-            <p:ph idx="1"/>
-          </p:nvPr>
-        </p:nvSpPr>
-        <p:spPr/>
-        <p:txBody>
-          <a:bodyPr/>
-          <a:lstStyle/>
-          <a:p>
+            <a:pPr marL="0" indent="0" algn="ctr">
+              <a:buNone/>
+            </a:pPr>
             <a:r>
               <a:rPr lang="ru-RU" sz="2400" dirty="0" smtClean="0"/>
-              <a:t>Реализована регистрация гостей на сайте, с помощью </a:t>
-            </a:r>
-            <a:r>
-              <a:rPr lang="ru-RU" sz="2400" dirty="0" err="1" smtClean="0"/>
+              <a:t>Предусмотрена регистрация </a:t>
+            </a:r>
+            <a:r>
+              <a:rPr lang="ru-RU" sz="2400" dirty="0"/>
+              <a:t>гостей на сайте, с помощью </a:t>
+            </a:r>
+            <a:r>
+              <a:rPr lang="ru-RU" sz="2400" dirty="0" err="1"/>
               <a:t>Django</a:t>
             </a:r>
             <a:r>
-              <a:rPr lang="ru-RU" sz="2400" dirty="0" smtClean="0"/>
+              <a:rPr lang="ru-RU" sz="2400" dirty="0"/>
               <a:t> </a:t>
             </a:r>
             <a:r>
-              <a:rPr lang="ru-RU" sz="2400" dirty="0" err="1" smtClean="0"/>
+              <a:rPr lang="ru-RU" sz="2400" dirty="0" err="1"/>
               <a:t>Crispy</a:t>
             </a:r>
             <a:r>
-              <a:rPr lang="ru-RU" sz="2400" dirty="0" smtClean="0"/>
+              <a:rPr lang="ru-RU" sz="2400" dirty="0"/>
               <a:t> </a:t>
             </a:r>
             <a:r>
-              <a:rPr lang="ru-RU" sz="2400" dirty="0" err="1" smtClean="0"/>
+              <a:rPr lang="ru-RU" sz="2400" dirty="0" err="1"/>
               <a:t>Forms</a:t>
             </a:r>
             <a:r>
-              <a:rPr lang="ru-RU" sz="2400" dirty="0" smtClean="0"/>
+              <a:rPr lang="ru-RU" sz="2400" dirty="0"/>
               <a:t>. </a:t>
             </a:r>
             <a:r>
-              <a:rPr lang="ru-RU" sz="2400" dirty="0" err="1" smtClean="0"/>
+              <a:rPr lang="ru-RU" sz="2400" dirty="0" err="1"/>
               <a:t>Crispy</a:t>
             </a:r>
             <a:r>
-              <a:rPr lang="ru-RU" sz="2400" dirty="0" smtClean="0"/>
+              <a:rPr lang="ru-RU" sz="2400" dirty="0"/>
               <a:t> </a:t>
             </a:r>
             <a:r>
-              <a:rPr lang="ru-RU" sz="2400" dirty="0" err="1" smtClean="0"/>
+              <a:rPr lang="ru-RU" sz="2400" dirty="0" err="1"/>
               <a:t>Forms</a:t>
             </a:r>
             <a:r>
-              <a:rPr lang="ru-RU" sz="2400" dirty="0" smtClean="0"/>
+              <a:rPr lang="ru-RU" sz="2400" dirty="0"/>
               <a:t> - усовершенствованное отображение форм в </a:t>
             </a:r>
             <a:r>
-              <a:rPr lang="ru-RU" sz="2400" dirty="0" err="1" smtClean="0"/>
+              <a:rPr lang="ru-RU" sz="2400" dirty="0" err="1"/>
               <a:t>Bootstrap</a:t>
             </a:r>
             <a:r>
-              <a:rPr lang="ru-RU" sz="2400" dirty="0" smtClean="0"/>
+              <a:rPr lang="ru-RU" sz="2400" dirty="0"/>
               <a:t>. </a:t>
             </a:r>
           </a:p>
           <a:p>
-            <a:endParaRPr lang="ru-RU" sz="2400" dirty="0" smtClean="0"/>
+            <a:endParaRPr lang="ru-RU" sz="2400" dirty="0"/>
           </a:p>
           <a:p>
             <a:endParaRPr lang="ru-RU" dirty="0"/>
@@ -4301,8 +4696,8 @@
         </p:blipFill>
         <p:spPr>
           <a:xfrm>
-            <a:off x="971600" y="2852936"/>
-            <a:ext cx="6984776" cy="3204969"/>
+            <a:off x="1739516" y="1700808"/>
+            <a:ext cx="8712968" cy="4701890"/>
           </a:xfrm>
           <a:prstGeom prst="rect">
             <a:avLst/>
@@ -4341,29 +4736,6 @@
       </p:grpSpPr>
       <p:sp>
         <p:nvSpPr>
-          <p:cNvPr id="2" name="Заголовок 1"/>
-          <p:cNvSpPr>
-            <a:spLocks noGrp="1"/>
-          </p:cNvSpPr>
-          <p:nvPr>
-            <p:ph type="title"/>
-          </p:nvPr>
-        </p:nvSpPr>
-        <p:spPr/>
-        <p:txBody>
-          <a:bodyPr/>
-          <a:lstStyle/>
-          <a:p>
-            <a:r>
-              <a:rPr lang="ru-RU" dirty="0" smtClean="0"/>
-              <a:t>Что реализовано в проекте</a:t>
-            </a:r>
-            <a:endParaRPr lang="ru-RU" dirty="0"/>
-          </a:p>
-        </p:txBody>
-      </p:sp>
-      <p:sp>
-        <p:nvSpPr>
           <p:cNvPr id="3" name="Объект 2"/>
           <p:cNvSpPr>
             <a:spLocks noGrp="1"/>
@@ -4372,18 +4744,31 @@
             <p:ph idx="1"/>
           </p:nvPr>
         </p:nvSpPr>
-        <p:spPr/>
-        <p:txBody>
-          <a:bodyPr/>
-          <a:lstStyle/>
-          <a:p>
-            <a:pPr lvl="0"/>
+        <p:spPr>
+          <a:xfrm>
+            <a:off x="551384" y="188640"/>
+            <a:ext cx="10972800" cy="6192688"/>
+          </a:xfrm>
+        </p:spPr>
+        <p:txBody>
+          <a:bodyPr>
+            <a:normAutofit/>
+          </a:bodyPr>
+          <a:lstStyle/>
+          <a:p>
+            <a:pPr marL="0" lvl="0" indent="0">
+              <a:buNone/>
+            </a:pPr>
             <a:r>
               <a:rPr lang="ru-RU" sz="2400" dirty="0"/>
-              <a:t>Настроены страницы регистрации, </a:t>
-            </a:r>
-            <a:r>
-              <a:rPr lang="en-US" sz="2400" dirty="0"/>
+              <a:t>   </a:t>
+            </a:r>
+            <a:r>
+              <a:rPr lang="ru-RU" sz="2400" dirty="0" smtClean="0"/>
+              <a:t>Предусмотрены страницы </a:t>
+            </a:r>
+            <a:r>
+              <a:rPr lang="en-US" sz="2400" dirty="0" smtClean="0"/>
               <a:t>Login</a:t>
             </a:r>
             <a:r>
@@ -4391,66 +4776,131 @@
               <a:t>, </a:t>
             </a:r>
             <a:r>
-              <a:rPr lang="en-US" sz="2400" dirty="0" smtClean="0"/>
-              <a:t>Log</a:t>
-            </a:r>
-            <a:r>
               <a:rPr lang="en-US" sz="2400" dirty="0"/>
-              <a:t>o</a:t>
-            </a:r>
-            <a:r>
-              <a:rPr lang="en-US" sz="2400" dirty="0" smtClean="0"/>
-              <a:t>ut</a:t>
+              <a:t>Logout</a:t>
             </a:r>
             <a:r>
               <a:rPr lang="ru-RU" sz="2400" dirty="0"/>
-              <a:t>, страница профиля гостя, с возможностью </a:t>
+              <a:t>, страница профиля гостя, с возможностью смены </a:t>
             </a:r>
             <a:r>
               <a:rPr lang="ru-RU" sz="2400" dirty="0" smtClean="0"/>
-              <a:t>сме</a:t>
-            </a:r>
-            <a:r>
-              <a:rPr lang="ru-RU" sz="2400" dirty="0"/>
-              <a:t>н</a:t>
-            </a:r>
-            <a:r>
-              <a:rPr lang="ru-RU" sz="2400" dirty="0" smtClean="0"/>
-              <a:t>ы </a:t>
-            </a:r>
-            <a:r>
-              <a:rPr lang="ru-RU" sz="2400" dirty="0"/>
               <a:t>имени</a:t>
             </a:r>
           </a:p>
           <a:p>
-            <a:pPr lvl="0"/>
-            <a:r>
-              <a:rPr lang="ru-RU" sz="2400" dirty="0"/>
-              <a:t>Предусмотрены </a:t>
-            </a:r>
-            <a:r>
-              <a:rPr lang="ru-RU" sz="2400" dirty="0" smtClean="0"/>
-              <a:t>таблицы </a:t>
-            </a:r>
-            <a:r>
-              <a:rPr lang="ru-RU" sz="2400" dirty="0"/>
-              <a:t>в базе данных. 1. Дом. 2.Локация. 3. Сенсоры. Реализована связь таблиц между собой с помощью </a:t>
-            </a:r>
-            <a:r>
-              <a:rPr lang="ru-RU" sz="2400" dirty="0" err="1"/>
+            <a:pPr marL="0" lvl="0" indent="0">
+              <a:buNone/>
+            </a:pPr>
+            <a:endParaRPr lang="ru-RU" sz="2400" dirty="0" smtClean="0"/>
+          </a:p>
+          <a:p>
+            <a:pPr marL="0" lvl="0" indent="0">
+              <a:buNone/>
+            </a:pPr>
+            <a:endParaRPr lang="ru-RU" sz="2400" dirty="0" smtClean="0"/>
+          </a:p>
+          <a:p>
+            <a:pPr marL="0" lvl="0" indent="0">
+              <a:buNone/>
+            </a:pPr>
+            <a:endParaRPr lang="ru-RU" sz="2400" dirty="0"/>
+          </a:p>
+          <a:p>
+            <a:pPr marL="0" lvl="0" indent="0">
+              <a:buNone/>
+            </a:pPr>
+            <a:endParaRPr lang="ru-RU" sz="2400" dirty="0" smtClean="0"/>
+          </a:p>
+          <a:p>
+            <a:pPr marL="0" lvl="0" indent="0">
+              <a:buNone/>
+            </a:pPr>
+            <a:endParaRPr lang="ru-RU" sz="2400" dirty="0" smtClean="0"/>
+          </a:p>
+          <a:p>
+            <a:pPr marL="0" lvl="0" indent="0">
+              <a:buNone/>
+            </a:pPr>
+            <a:endParaRPr lang="ru-RU" sz="2400" dirty="0" smtClean="0"/>
+          </a:p>
+          <a:p>
+            <a:pPr marL="0" lvl="0" indent="0">
+              <a:buNone/>
+            </a:pPr>
+            <a:endParaRPr lang="ru-RU" sz="2400" dirty="0"/>
+          </a:p>
+          <a:p>
+            <a:pPr marL="0" lvl="0" indent="0">
+              <a:buNone/>
+            </a:pPr>
+            <a:endParaRPr lang="ru-RU" sz="2000" dirty="0" smtClean="0"/>
+          </a:p>
+          <a:p>
+            <a:pPr marL="0" lvl="0" indent="0">
+              <a:buNone/>
+            </a:pPr>
+            <a:r>
+              <a:rPr lang="ru-RU" sz="2000" dirty="0" smtClean="0"/>
+              <a:t>    </a:t>
+            </a:r>
+            <a:r>
+              <a:rPr lang="ru-RU" sz="2000" dirty="0"/>
+              <a:t>Предусмотрены таблицы в базе данных:</a:t>
+            </a:r>
+          </a:p>
+          <a:p>
+            <a:pPr marL="809625" lvl="0">
+              <a:buFont typeface="Wingdings" panose="05000000000000000000" pitchFamily="2" charset="2"/>
+              <a:buChar char="§"/>
+            </a:pPr>
+            <a:r>
+              <a:rPr lang="ru-RU" sz="2000" dirty="0"/>
+              <a:t> Дом</a:t>
+            </a:r>
+          </a:p>
+          <a:p>
+            <a:pPr marL="809625" lvl="0">
+              <a:buFont typeface="Wingdings" panose="05000000000000000000" pitchFamily="2" charset="2"/>
+              <a:buChar char="§"/>
+            </a:pPr>
+            <a:r>
+              <a:rPr lang="ru-RU" sz="2000" dirty="0"/>
+              <a:t>Локация</a:t>
+            </a:r>
+          </a:p>
+          <a:p>
+            <a:pPr marL="809625" lvl="0">
+              <a:buFont typeface="Wingdings" panose="05000000000000000000" pitchFamily="2" charset="2"/>
+              <a:buChar char="§"/>
+            </a:pPr>
+            <a:r>
+              <a:rPr lang="ru-RU" sz="2000" dirty="0"/>
+              <a:t>Сенсоры.</a:t>
+            </a:r>
+          </a:p>
+          <a:p>
+            <a:pPr marL="0" lvl="0" indent="0">
+              <a:buNone/>
+            </a:pPr>
+            <a:r>
+              <a:rPr lang="ru-RU" sz="2000" dirty="0"/>
+              <a:t>    Реализована связь таблиц между собой с помощью </a:t>
+            </a:r>
+            <a:r>
+              <a:rPr lang="ru-RU" sz="2000" dirty="0" err="1"/>
               <a:t>ForeignKey</a:t>
             </a:r>
             <a:r>
-              <a:rPr lang="ru-RU" sz="2400" dirty="0"/>
+              <a:rPr lang="ru-RU" sz="2000" dirty="0"/>
               <a:t> и </a:t>
             </a:r>
             <a:r>
-              <a:rPr lang="ru-RU" sz="2400" dirty="0" err="1"/>
+              <a:rPr lang="ru-RU" sz="2000" dirty="0" err="1"/>
               <a:t>ManyToManyField</a:t>
             </a:r>
             <a:r>
-              <a:rPr lang="ru-RU" sz="2400" dirty="0" smtClean="0"/>
+              <a:rPr lang="ru-RU" sz="2000" dirty="0"/>
               <a:t>.</a:t>
             </a:r>
           </a:p>
@@ -4463,6 +4913,134 @@
           </a:p>
         </p:txBody>
       </p:sp>
+      <p:pic>
+        <p:nvPicPr>
+          <p:cNvPr id="2050" name="Picture 2"/>
+          <p:cNvPicPr>
+            <a:picLocks noChangeAspect="1" noChangeArrowheads="1"/>
+          </p:cNvPicPr>
+          <p:nvPr/>
+        </p:nvPicPr>
+        <p:blipFill>
+          <a:blip r:embed="rId2">
+            <a:extLst>
+              <a:ext uri="{28A0092B-C50C-407E-A947-70E740481C1C}">
+                <a14:useLocalDpi xmlns:a14="http://schemas.microsoft.com/office/drawing/2010/main" val="0"/>
+              </a:ext>
+            </a:extLst>
+          </a:blip>
+          <a:srcRect/>
+          <a:stretch>
+            <a:fillRect/>
+          </a:stretch>
+        </p:blipFill>
+        <p:spPr bwMode="auto">
+          <a:xfrm>
+            <a:off x="1487488" y="923929"/>
+            <a:ext cx="2295525" cy="3543300"/>
+          </a:xfrm>
+          <a:prstGeom prst="rect">
+            <a:avLst/>
+          </a:prstGeom>
+          <a:noFill/>
+          <a:ln>
+            <a:noFill/>
+          </a:ln>
+          <a:effectLst/>
+          <a:extLst>
+            <a:ext uri="{909E8E84-426E-40DD-AFC4-6F175D3DCCD1}">
+              <a14:hiddenFill xmlns:a14="http://schemas.microsoft.com/office/drawing/2010/main">
+                <a:solidFill>
+                  <a:schemeClr val="accent1"/>
+                </a:solidFill>
+              </a14:hiddenFill>
+            </a:ext>
+            <a:ext uri="{91240B29-F687-4F45-9708-019B960494DF}">
+              <a14:hiddenLine xmlns:a14="http://schemas.microsoft.com/office/drawing/2010/main" w="9525">
+                <a:solidFill>
+                  <a:schemeClr val="tx1"/>
+                </a:solidFill>
+                <a:miter lim="800000"/>
+                <a:headEnd/>
+                <a:tailEnd/>
+              </a14:hiddenLine>
+            </a:ext>
+            <a:ext uri="{AF507438-7753-43E0-B8FC-AC1667EBCBE1}">
+              <a14:hiddenEffects xmlns:a14="http://schemas.microsoft.com/office/drawing/2010/main">
+                <a:effectLst>
+                  <a:outerShdw dist="35921" dir="2700000" algn="ctr" rotWithShape="0">
+                    <a:schemeClr val="bg2"/>
+                  </a:outerShdw>
+                </a:effectLst>
+              </a14:hiddenEffects>
+            </a:ext>
+          </a:extLst>
+        </p:spPr>
+      </p:pic>
+      <p:pic>
+        <p:nvPicPr>
+          <p:cNvPr id="2051" name="Picture 3"/>
+          <p:cNvPicPr>
+            <a:picLocks noChangeAspect="1" noChangeArrowheads="1"/>
+          </p:cNvPicPr>
+          <p:nvPr/>
+        </p:nvPicPr>
+        <p:blipFill>
+          <a:blip r:embed="rId3">
+            <a:extLst>
+              <a:ext uri="{28A0092B-C50C-407E-A947-70E740481C1C}">
+                <a14:useLocalDpi xmlns:a14="http://schemas.microsoft.com/office/drawing/2010/main" val="0"/>
+              </a:ext>
+            </a:extLst>
+          </a:blip>
+          <a:srcRect/>
+          <a:stretch>
+            <a:fillRect/>
+          </a:stretch>
+        </p:blipFill>
+        <p:spPr bwMode="auto">
+          <a:xfrm>
+            <a:off x="5663952" y="1318295"/>
+            <a:ext cx="3829050" cy="2724150"/>
+          </a:xfrm>
+          <a:prstGeom prst="rect">
+            <a:avLst/>
+          </a:prstGeom>
+          <a:noFill/>
+          <a:ln>
+            <a:noFill/>
+          </a:ln>
+          <a:effectLst/>
+          <a:extLst>
+            <a:ext uri="{909E8E84-426E-40DD-AFC4-6F175D3DCCD1}">
+              <a14:hiddenFill xmlns:a14="http://schemas.microsoft.com/office/drawing/2010/main">
+                <a:solidFill>
+                  <a:schemeClr val="accent1"/>
+                </a:solidFill>
+              </a14:hiddenFill>
+            </a:ext>
+            <a:ext uri="{91240B29-F687-4F45-9708-019B960494DF}">
+              <a14:hiddenLine xmlns:a14="http://schemas.microsoft.com/office/drawing/2010/main" w="9525">
+                <a:solidFill>
+                  <a:schemeClr val="tx1"/>
+                </a:solidFill>
+                <a:miter lim="800000"/>
+                <a:headEnd/>
+                <a:tailEnd/>
+              </a14:hiddenLine>
+            </a:ext>
+            <a:ext uri="{AF507438-7753-43E0-B8FC-AC1667EBCBE1}">
+              <a14:hiddenEffects xmlns:a14="http://schemas.microsoft.com/office/drawing/2010/main">
+                <a:effectLst>
+                  <a:outerShdw dist="35921" dir="2700000" algn="ctr" rotWithShape="0">
+                    <a:schemeClr val="bg2"/>
+                  </a:outerShdw>
+                </a:effectLst>
+              </a14:hiddenEffects>
+            </a:ext>
+          </a:extLst>
+        </p:spPr>
+      </p:pic>
     </p:spTree>
     <p:extLst>
       <p:ext uri="{BB962C8B-B14F-4D97-AF65-F5344CB8AC3E}">
@@ -4495,29 +5073,6 @@
       </p:grpSpPr>
       <p:sp>
         <p:nvSpPr>
-          <p:cNvPr id="2" name="Заголовок 1"/>
-          <p:cNvSpPr>
-            <a:spLocks noGrp="1"/>
-          </p:cNvSpPr>
-          <p:nvPr>
-            <p:ph type="title"/>
-          </p:nvPr>
-        </p:nvSpPr>
-        <p:spPr/>
-        <p:txBody>
-          <a:bodyPr/>
-          <a:lstStyle/>
-          <a:p>
-            <a:r>
-              <a:rPr lang="ru-RU" dirty="0" smtClean="0"/>
-              <a:t>Что реализовано в проекте</a:t>
-            </a:r>
-            <a:endParaRPr lang="ru-RU" dirty="0"/>
-          </a:p>
-        </p:txBody>
-      </p:sp>
-      <p:sp>
-        <p:nvSpPr>
           <p:cNvPr id="3" name="Объект 2"/>
           <p:cNvSpPr>
             <a:spLocks noGrp="1"/>
@@ -4526,47 +5081,54 @@
             <p:ph idx="1"/>
           </p:nvPr>
         </p:nvSpPr>
-        <p:spPr/>
-        <p:txBody>
-          <a:bodyPr/>
+        <p:spPr>
+          <a:xfrm>
+            <a:off x="623392" y="980728"/>
+            <a:ext cx="10972800" cy="4525963"/>
+          </a:xfrm>
+        </p:spPr>
+        <p:txBody>
+          <a:bodyPr>
+            <a:normAutofit/>
+          </a:bodyPr>
           <a:lstStyle/>
           <a:p>
             <a:pPr lvl="0"/>
             <a:r>
-              <a:rPr lang="ru-RU" dirty="0" smtClean="0"/>
+              <a:rPr lang="ru-RU" sz="2400" dirty="0"/>
               <a:t>Заполнение базы данных реализовано с помощью </a:t>
             </a:r>
             <a:r>
-              <a:rPr lang="ru-RU" dirty="0" err="1" smtClean="0"/>
+              <a:rPr lang="ru-RU" sz="2400" dirty="0" err="1"/>
               <a:t>фикстур</a:t>
             </a:r>
             <a:r>
-              <a:rPr lang="ru-RU" dirty="0" smtClean="0"/>
+              <a:rPr lang="ru-RU" sz="2400" dirty="0"/>
               <a:t> в </a:t>
             </a:r>
             <a:r>
-              <a:rPr lang="ru-RU" dirty="0" err="1" smtClean="0"/>
+              <a:rPr lang="ru-RU" sz="2400" dirty="0" err="1"/>
               <a:t>Django</a:t>
             </a:r>
             <a:r>
-              <a:rPr lang="ru-RU" dirty="0" smtClean="0"/>
+              <a:rPr lang="ru-RU" sz="2400" dirty="0"/>
               <a:t>. С помощью </a:t>
             </a:r>
             <a:r>
-              <a:rPr lang="ru-RU" dirty="0" err="1" smtClean="0"/>
+              <a:rPr lang="ru-RU" sz="2400" dirty="0" err="1"/>
               <a:t>json</a:t>
             </a:r>
             <a:r>
-              <a:rPr lang="ru-RU" dirty="0" smtClean="0"/>
+              <a:rPr lang="ru-RU" sz="2400" dirty="0"/>
               <a:t> файла можно загрузить много данных в базу, указав любые поля и таблицы.</a:t>
             </a:r>
           </a:p>
           <a:p>
             <a:pPr lvl="0"/>
-            <a:endParaRPr lang="ru-RU" dirty="0" smtClean="0"/>
-          </a:p>
-          <a:p>
-            <a:endParaRPr lang="ru-RU" dirty="0"/>
+            <a:endParaRPr lang="ru-RU" sz="2400" dirty="0"/>
+          </a:p>
+          <a:p>
+            <a:endParaRPr lang="ru-RU" sz="2400" dirty="0"/>
           </a:p>
         </p:txBody>
       </p:sp>
@@ -4593,8 +5155,8 @@
         </p:blipFill>
         <p:spPr bwMode="auto">
           <a:xfrm>
-            <a:off x="1066215" y="3645024"/>
-            <a:ext cx="3600400" cy="2808312"/>
+            <a:off x="3575720" y="2601755"/>
+            <a:ext cx="4752528" cy="3706972"/>
           </a:xfrm>
           <a:prstGeom prst="rect">
             <a:avLst/>
@@ -4666,29 +5228,6 @@
       </p:grpSpPr>
       <p:sp>
         <p:nvSpPr>
-          <p:cNvPr id="2" name="Заголовок 1"/>
-          <p:cNvSpPr>
-            <a:spLocks noGrp="1"/>
-          </p:cNvSpPr>
-          <p:nvPr>
-            <p:ph type="title"/>
-          </p:nvPr>
-        </p:nvSpPr>
-        <p:spPr/>
-        <p:txBody>
-          <a:bodyPr/>
-          <a:lstStyle/>
-          <a:p>
-            <a:r>
-              <a:rPr lang="ru-RU" dirty="0" smtClean="0"/>
-              <a:t>Что реализовано в проекте</a:t>
-            </a:r>
-            <a:endParaRPr lang="ru-RU" dirty="0"/>
-          </a:p>
-        </p:txBody>
-      </p:sp>
-      <p:sp>
-        <p:nvSpPr>
           <p:cNvPr id="3" name="Объект 2"/>
           <p:cNvSpPr>
             <a:spLocks noGrp="1"/>
@@ -4697,7 +5236,12 @@
             <p:ph idx="1"/>
           </p:nvPr>
         </p:nvSpPr>
-        <p:spPr/>
+        <p:spPr>
+          <a:xfrm>
+            <a:off x="609600" y="692696"/>
+            <a:ext cx="10972800" cy="5433469"/>
+          </a:xfrm>
+        </p:spPr>
         <p:txBody>
           <a:bodyPr>
             <a:normAutofit/>
@@ -4715,29 +5259,17 @@
             </a:r>
             <a:r>
               <a:rPr lang="ru-RU" sz="2000" dirty="0"/>
-              <a:t>панель, </a:t>
-            </a:r>
-            <a:r>
-              <a:rPr lang="ru-RU" sz="2000" dirty="0" smtClean="0"/>
-              <a:t>для</a:t>
-            </a:r>
-            <a:r>
-              <a:rPr lang="en-US" sz="2000" dirty="0" smtClean="0"/>
+              <a:t>панель, для</a:t>
+            </a:r>
+            <a:r>
+              <a:rPr lang="en-US" sz="2000" dirty="0"/>
               <a:t> </a:t>
             </a:r>
             <a:r>
-              <a:rPr lang="ru-RU" sz="2000" dirty="0" smtClean="0"/>
-              <a:t>отображения всей </a:t>
-            </a:r>
-            <a:r>
-              <a:rPr lang="ru-RU" sz="2000" dirty="0" err="1" smtClean="0"/>
-              <a:t>инфомрации</a:t>
-            </a:r>
-            <a:r>
-              <a:rPr lang="ru-RU" sz="2000" dirty="0" smtClean="0"/>
-              <a:t> по датчикам и локациям</a:t>
-            </a:r>
-            <a:endParaRPr lang="en-US" sz="2000" dirty="0" smtClean="0"/>
+              <a:rPr lang="ru-RU" sz="2000" dirty="0"/>
+              <a:t>отображения всей информации по датчикам и локациям</a:t>
+            </a:r>
+            <a:endParaRPr lang="en-US" sz="2000" dirty="0"/>
           </a:p>
           <a:p>
             <a:pPr lvl="0"/>
@@ -4750,7 +5282,7 @@
       </p:sp>
       <p:pic>
         <p:nvPicPr>
-          <p:cNvPr id="1026" name="Picture 2"/>
+          <p:cNvPr id="3074" name="Picture 2"/>
           <p:cNvPicPr>
             <a:picLocks noChangeAspect="1" noChangeArrowheads="1"/>
           </p:cNvPicPr>
@@ -4771,8 +5303,8 @@
         </p:blipFill>
         <p:spPr bwMode="auto">
           <a:xfrm>
-            <a:off x="251520" y="2348880"/>
-            <a:ext cx="8784976" cy="2233584"/>
+            <a:off x="925889" y="1196752"/>
+            <a:ext cx="9649072" cy="5068958"/>
           </a:xfrm>
           <a:prstGeom prst="rect">
             <a:avLst/>

</xml_diff>